<commit_message>
Added link to webapp in slides.
</commit_message>
<xml_diff>
--- a/documentation/Theano Project Presentation Main.pptx
+++ b/documentation/Theano Project Presentation Main.pptx
@@ -8351,7 +8351,7 @@
         </p:nvSpPr>
         <p:spPr>
           <a:xfrm>
-            <a:off x="206460" y="504639"/>
+            <a:off x="58771" y="520737"/>
             <a:ext cx="3894760" cy="559200"/>
           </a:xfrm>
           <a:prstGeom prst="rect">
@@ -8422,8 +8422,8 @@
         </p:nvSpPr>
         <p:spPr>
           <a:xfrm>
-            <a:off x="311760" y="1063839"/>
-            <a:ext cx="4396042" cy="3416100"/>
+            <a:off x="154160" y="1079937"/>
+            <a:ext cx="5309279" cy="3416100"/>
           </a:xfrm>
           <a:prstGeom prst="rect">
             <a:avLst/>
@@ -8541,6 +8541,57 @@
             </a:r>
           </a:p>
           <a:p>
+            <a:pPr>
+              <a:lnSpc>
+                <a:spcPct val="115000"/>
+              </a:lnSpc>
+            </a:pPr>
+            <a:endParaRPr lang="en-GB" sz="1600" dirty="0">
+              <a:solidFill>
+                <a:schemeClr val="tx1"/>
+              </a:solidFill>
+              <a:latin typeface="PT Sans" panose="020B0503020203020204" pitchFamily="34" charset="77"/>
+            </a:endParaRPr>
+          </a:p>
+          <a:p>
+            <a:pPr>
+              <a:lnSpc>
+                <a:spcPct val="115000"/>
+              </a:lnSpc>
+            </a:pPr>
+            <a:r>
+              <a:rPr lang="en-GB" sz="1600" dirty="0">
+                <a:solidFill>
+                  <a:schemeClr val="tx1"/>
+                </a:solidFill>
+                <a:latin typeface="PT Sans" panose="020B0503020203020204" pitchFamily="34" charset="77"/>
+              </a:rPr>
+              <a:t>Link to Web App - </a:t>
+            </a:r>
+            <a:r>
+              <a:rPr lang="en-GB" sz="1600" dirty="0">
+                <a:solidFill>
+                  <a:srgbClr val="0070C0"/>
+                </a:solidFill>
+                <a:latin typeface="PT Sans" panose="020B0503020203020204" pitchFamily="34" charset="77"/>
+                <a:hlinkClick r:id="rId4">
+                  <a:extLst>
+                    <a:ext uri="{A12FA001-AC4F-418D-AE19-62706E023703}">
+                      <ahyp:hlinkClr xmlns:ahyp="http://schemas.microsoft.com/office/drawing/2018/hyperlinkcolor" val="tx"/>
+                    </a:ext>
+                  </a:extLst>
+                </a:hlinkClick>
+              </a:rPr>
+              <a:t>https://bit.ly/africa-crime-forecasting-tool</a:t>
+            </a:r>
+            <a:endParaRPr lang="en-GB" sz="1600" dirty="0">
+              <a:solidFill>
+                <a:srgbClr val="0070C0"/>
+              </a:solidFill>
+              <a:latin typeface="PT Sans" panose="020B0503020203020204" pitchFamily="34" charset="77"/>
+            </a:endParaRPr>
+          </a:p>
+          <a:p>
             <a:pPr lvl="0">
               <a:lnSpc>
                 <a:spcPct val="115000"/>
@@ -8570,15 +8621,15 @@
           <p:nvPr/>
         </p:nvPicPr>
         <p:blipFill>
-          <a:blip r:embed="rId4"/>
+          <a:blip r:embed="rId5"/>
           <a:stretch>
             <a:fillRect/>
           </a:stretch>
         </p:blipFill>
         <p:spPr>
           <a:xfrm>
-            <a:off x="5088305" y="1611808"/>
-            <a:ext cx="3743935" cy="2497204"/>
+            <a:off x="5558828" y="1602754"/>
+            <a:ext cx="3585172" cy="2391309"/>
           </a:xfrm>
           <a:prstGeom prst="rect">
             <a:avLst/>

</xml_diff>

<commit_message>
Added link to GitHub repo in slides.
</commit_message>
<xml_diff>
--- a/documentation/Theano Project Presentation Main.pptx
+++ b/documentation/Theano Project Presentation Main.pptx
@@ -8586,6 +8586,44 @@
             </a:r>
             <a:endParaRPr lang="en-GB" sz="1600" dirty="0">
               <a:solidFill>
+                <a:schemeClr val="tx1"/>
+              </a:solidFill>
+              <a:latin typeface="PT Sans" panose="020B0503020203020204" pitchFamily="34" charset="77"/>
+            </a:endParaRPr>
+          </a:p>
+          <a:p>
+            <a:pPr>
+              <a:lnSpc>
+                <a:spcPct val="115000"/>
+              </a:lnSpc>
+            </a:pPr>
+            <a:r>
+              <a:rPr lang="en-GB" sz="1600" dirty="0">
+                <a:solidFill>
+                  <a:schemeClr val="tx1"/>
+                </a:solidFill>
+                <a:latin typeface="PT Sans" panose="020B0503020203020204" pitchFamily="34" charset="77"/>
+              </a:rPr>
+              <a:t>Link to GitHub repo - </a:t>
+            </a:r>
+            <a:r>
+              <a:rPr lang="en-GB" sz="1600" dirty="0">
+                <a:solidFill>
+                  <a:srgbClr val="0070C0"/>
+                </a:solidFill>
+                <a:latin typeface="PT Sans" panose="020B0503020203020204" pitchFamily="34" charset="77"/>
+                <a:hlinkClick r:id="rId5">
+                  <a:extLst>
+                    <a:ext uri="{A12FA001-AC4F-418D-AE19-62706E023703}">
+                      <ahyp:hlinkClr xmlns:ahyp="http://schemas.microsoft.com/office/drawing/2018/hyperlinkcolor" val="tx"/>
+                    </a:ext>
+                  </a:extLst>
+                </a:hlinkClick>
+              </a:rPr>
+              <a:t>Team-Theano-Capstone-Project</a:t>
+            </a:r>
+            <a:endParaRPr lang="en-GB" sz="1600" dirty="0">
+              <a:solidFill>
                 <a:srgbClr val="0070C0"/>
               </a:solidFill>
               <a:latin typeface="PT Sans" panose="020B0503020203020204" pitchFamily="34" charset="77"/>
@@ -8621,7 +8659,7 @@
           <p:nvPr/>
         </p:nvPicPr>
         <p:blipFill>
-          <a:blip r:embed="rId5"/>
+          <a:blip r:embed="rId6"/>
           <a:stretch>
             <a:fillRect/>
           </a:stretch>

</xml_diff>

<commit_message>
Included Lateefah's name among other active members in slide.
</commit_message>
<xml_diff>
--- a/documentation/Theano Project Presentation Main.pptx
+++ b/documentation/Theano Project Presentation Main.pptx
@@ -9427,7 +9427,7 @@
           <p:nvPr>
             <p:extLst>
               <p:ext uri="{D42A27DB-BD31-4B8C-83A1-F6EECF244321}">
-                <p14:modId xmlns:p14="http://schemas.microsoft.com/office/powerpoint/2010/main" val="1070989260"/>
+                <p14:modId xmlns:p14="http://schemas.microsoft.com/office/powerpoint/2010/main" val="1222936842"/>
               </p:ext>
             </p:extLst>
           </p:nvPr>
@@ -9458,7 +9458,9 @@
                     <a:lstStyle/>
                     <a:p>
                       <a:r>
-                        <a:rPr lang="en-NG" dirty="0"/>
+                        <a:rPr lang="en-NG" dirty="0">
+                          <a:latin typeface="PT Sans" panose="020B0503020203020204" pitchFamily="34" charset="77"/>
+                        </a:rPr>
                         <a:t>Chrispine Tot</a:t>
                       </a:r>
                     </a:p>
@@ -9478,7 +9480,9 @@
                     <a:lstStyle/>
                     <a:p>
                       <a:r>
-                        <a:rPr lang="en-NG" dirty="0"/>
+                        <a:rPr lang="en-NG" dirty="0">
+                          <a:latin typeface="PT Sans" panose="020B0503020203020204" pitchFamily="34" charset="77"/>
+                        </a:rPr>
                         <a:t>Monicah Omondi</a:t>
                       </a:r>
                     </a:p>
@@ -9498,7 +9502,9 @@
                     <a:lstStyle/>
                     <a:p>
                       <a:r>
-                        <a:rPr lang="en-NG" dirty="0"/>
+                        <a:rPr lang="en-NG" dirty="0">
+                          <a:latin typeface="PT Sans" panose="020B0503020203020204" pitchFamily="34" charset="77"/>
+                        </a:rPr>
                         <a:t>Omojasola Juwon Ezekiel</a:t>
                       </a:r>
                     </a:p>
@@ -9537,7 +9543,9 @@
                         <a:defRPr/>
                       </a:pPr>
                       <a:r>
-                        <a:rPr lang="en-NG" dirty="0"/>
+                        <a:rPr lang="en-NG" dirty="0">
+                          <a:latin typeface="PT Sans" panose="020B0503020203020204" pitchFamily="34" charset="77"/>
+                        </a:rPr>
                         <a:t>Kafayat Ibrahim</a:t>
                       </a:r>
                     </a:p>
@@ -9559,7 +9567,48 @@
                     <a:bodyPr/>
                     <a:lstStyle/>
                     <a:p>
-                      <a:endParaRPr lang="en-NG" dirty="0"/>
+                      <a:r>
+                        <a:rPr lang="en-GB" sz="1400" b="0" i="0" u="none" strike="noStrike" cap="none" dirty="0" err="1">
+                          <a:solidFill>
+                            <a:srgbClr val="000000"/>
+                          </a:solidFill>
+                          <a:effectLst/>
+                          <a:latin typeface="PT Sans" panose="020B0503020203020204" pitchFamily="34" charset="77"/>
+                          <a:ea typeface="Arial"/>
+                          <a:cs typeface="Arial"/>
+                          <a:sym typeface="Arial"/>
+                        </a:rPr>
+                        <a:t>Lateefah</a:t>
+                      </a:r>
+                      <a:r>
+                        <a:rPr lang="en-GB" sz="1400" b="0" i="0" u="none" strike="noStrike" cap="none" dirty="0">
+                          <a:solidFill>
+                            <a:srgbClr val="000000"/>
+                          </a:solidFill>
+                          <a:effectLst/>
+                          <a:latin typeface="PT Sans" panose="020B0503020203020204" pitchFamily="34" charset="77"/>
+                          <a:ea typeface="Arial"/>
+                          <a:cs typeface="Arial"/>
+                          <a:sym typeface="Arial"/>
+                        </a:rPr>
+                        <a:t> </a:t>
+                      </a:r>
+                      <a:r>
+                        <a:rPr lang="en-GB" sz="1400" b="0" i="0" u="none" strike="noStrike" cap="none" dirty="0" err="1">
+                          <a:solidFill>
+                            <a:srgbClr val="000000"/>
+                          </a:solidFill>
+                          <a:effectLst/>
+                          <a:latin typeface="PT Sans" panose="020B0503020203020204" pitchFamily="34" charset="77"/>
+                          <a:ea typeface="Arial"/>
+                          <a:cs typeface="Arial"/>
+                          <a:sym typeface="Arial"/>
+                        </a:rPr>
+                        <a:t>Ajadi</a:t>
+                      </a:r>
+                      <a:endParaRPr lang="en-NG" dirty="0">
+                        <a:latin typeface="PT Sans" panose="020B0503020203020204" pitchFamily="34" charset="77"/>
+                      </a:endParaRPr>
                     </a:p>
                   </a:txBody>
                   <a:tcPr/>

</xml_diff>

<commit_message>
Added team's name to slide.
</commit_message>
<xml_diff>
--- a/documentation/Theano Project Presentation Main.pptx
+++ b/documentation/Theano Project Presentation Main.pptx
@@ -7327,6 +7327,43 @@
           </a:prstGeom>
         </p:spPr>
       </p:pic>
+      <p:sp>
+        <p:nvSpPr>
+          <p:cNvPr id="2" name="TextBox 1">
+            <a:extLst>
+              <a:ext uri="{FF2B5EF4-FFF2-40B4-BE49-F238E27FC236}">
+                <a16:creationId xmlns:a16="http://schemas.microsoft.com/office/drawing/2014/main" id="{1C78393F-8DED-9149-8B3D-4F74740E697B}"/>
+              </a:ext>
+            </a:extLst>
+          </p:cNvPr>
+          <p:cNvSpPr txBox="1"/>
+          <p:nvPr/>
+        </p:nvSpPr>
+        <p:spPr>
+          <a:xfrm>
+            <a:off x="250575" y="2642552"/>
+            <a:ext cx="3744936" cy="369332"/>
+          </a:xfrm>
+          <a:prstGeom prst="rect">
+            <a:avLst/>
+          </a:prstGeom>
+          <a:noFill/>
+        </p:spPr>
+        <p:txBody>
+          <a:bodyPr wrap="none" rtlCol="0">
+            <a:spAutoFit/>
+          </a:bodyPr>
+          <a:lstStyle/>
+          <a:p>
+            <a:r>
+              <a:rPr lang="en-NG" sz="1800" dirty="0">
+                <a:latin typeface="PT Sans" panose="020B0503020203020204" pitchFamily="34" charset="77"/>
+              </a:rPr>
+              <a:t>TEAM THEANO CAPSTONE PROJECT</a:t>
+            </a:r>
+          </a:p>
+        </p:txBody>
+      </p:sp>
     </p:spTree>
   </p:cSld>
   <p:clrMapOvr>

</xml_diff>

<commit_message>
Added introduction on crime to slides.
</commit_message>
<xml_diff>
--- a/documentation/Theano Project Presentation Main.pptx
+++ b/documentation/Theano Project Presentation Main.pptx
@@ -5,25 +5,26 @@
     <p:sldMasterId id="2147483659" r:id="rId1"/>
   </p:sldMasterIdLst>
   <p:notesMasterIdLst>
-    <p:notesMasterId r:id="rId18"/>
+    <p:notesMasterId r:id="rId19"/>
   </p:notesMasterIdLst>
   <p:sldIdLst>
     <p:sldId id="256" r:id="rId2"/>
     <p:sldId id="257" r:id="rId3"/>
-    <p:sldId id="258" r:id="rId4"/>
-    <p:sldId id="259" r:id="rId5"/>
-    <p:sldId id="260" r:id="rId6"/>
-    <p:sldId id="261" r:id="rId7"/>
-    <p:sldId id="262" r:id="rId8"/>
-    <p:sldId id="263" r:id="rId9"/>
-    <p:sldId id="264" r:id="rId10"/>
-    <p:sldId id="265" r:id="rId11"/>
-    <p:sldId id="271" r:id="rId12"/>
-    <p:sldId id="273" r:id="rId13"/>
-    <p:sldId id="277" r:id="rId14"/>
-    <p:sldId id="274" r:id="rId15"/>
-    <p:sldId id="275" r:id="rId16"/>
-    <p:sldId id="276" r:id="rId17"/>
+    <p:sldId id="278" r:id="rId4"/>
+    <p:sldId id="258" r:id="rId5"/>
+    <p:sldId id="259" r:id="rId6"/>
+    <p:sldId id="260" r:id="rId7"/>
+    <p:sldId id="261" r:id="rId8"/>
+    <p:sldId id="262" r:id="rId9"/>
+    <p:sldId id="263" r:id="rId10"/>
+    <p:sldId id="264" r:id="rId11"/>
+    <p:sldId id="265" r:id="rId12"/>
+    <p:sldId id="271" r:id="rId13"/>
+    <p:sldId id="273" r:id="rId14"/>
+    <p:sldId id="277" r:id="rId15"/>
+    <p:sldId id="274" r:id="rId16"/>
+    <p:sldId id="275" r:id="rId17"/>
+    <p:sldId id="276" r:id="rId18"/>
   </p:sldIdLst>
   <p:sldSz cx="9144000" cy="5143500" type="screen16x9"/>
   <p:notesSz cx="6858000" cy="9144000"/>
@@ -825,6 +826,110 @@
   <p:cSld>
     <p:spTree>
       <p:nvGrpSpPr>
+        <p:cNvPr id="1" name="Shape 114"/>
+        <p:cNvGrpSpPr/>
+        <p:nvPr/>
+      </p:nvGrpSpPr>
+      <p:grpSpPr>
+        <a:xfrm>
+          <a:off x="0" y="0"/>
+          <a:ext cx="0" cy="0"/>
+          <a:chOff x="0" y="0"/>
+          <a:chExt cx="0" cy="0"/>
+        </a:xfrm>
+      </p:grpSpPr>
+      <p:sp>
+        <p:nvSpPr>
+          <p:cNvPr id="115" name="Google Shape;115;g238b681e494_0_42:notes"/>
+          <p:cNvSpPr>
+            <a:spLocks noGrp="1" noRot="1" noChangeAspect="1"/>
+          </p:cNvSpPr>
+          <p:nvPr>
+            <p:ph type="sldImg" idx="2"/>
+          </p:nvPr>
+        </p:nvSpPr>
+        <p:spPr>
+          <a:xfrm>
+            <a:off x="381000" y="685800"/>
+            <a:ext cx="6096000" cy="3429000"/>
+          </a:xfrm>
+          <a:custGeom>
+            <a:avLst/>
+            <a:gdLst/>
+            <a:ahLst/>
+            <a:cxnLst/>
+            <a:rect l="l" t="t" r="r" b="b"/>
+            <a:pathLst>
+              <a:path w="120000" h="120000" extrusionOk="0">
+                <a:moveTo>
+                  <a:pt x="0" y="0"/>
+                </a:moveTo>
+                <a:lnTo>
+                  <a:pt x="120000" y="0"/>
+                </a:lnTo>
+                <a:lnTo>
+                  <a:pt x="120000" y="120000"/>
+                </a:lnTo>
+                <a:lnTo>
+                  <a:pt x="0" y="120000"/>
+                </a:lnTo>
+                <a:close/>
+              </a:path>
+            </a:pathLst>
+          </a:custGeom>
+        </p:spPr>
+      </p:sp>
+      <p:sp>
+        <p:nvSpPr>
+          <p:cNvPr id="116" name="Google Shape;116;g238b681e494_0_42:notes"/>
+          <p:cNvSpPr txBox="1">
+            <a:spLocks noGrp="1"/>
+          </p:cNvSpPr>
+          <p:nvPr>
+            <p:ph type="body" idx="1"/>
+          </p:nvPr>
+        </p:nvSpPr>
+        <p:spPr>
+          <a:xfrm>
+            <a:off x="685800" y="4343400"/>
+            <a:ext cx="5486400" cy="4114800"/>
+          </a:xfrm>
+          <a:prstGeom prst="rect">
+            <a:avLst/>
+          </a:prstGeom>
+        </p:spPr>
+        <p:txBody>
+          <a:bodyPr spcFirstLastPara="1" wrap="square" lIns="91425" tIns="91425" rIns="91425" bIns="91425" anchor="t" anchorCtr="0">
+            <a:noAutofit/>
+          </a:bodyPr>
+          <a:lstStyle/>
+          <a:p>
+            <a:pPr marL="0" lvl="0" indent="0" algn="l" rtl="0">
+              <a:spcBef>
+                <a:spcPts val="0"/>
+              </a:spcBef>
+              <a:spcAft>
+                <a:spcPts val="0"/>
+              </a:spcAft>
+              <a:buNone/>
+            </a:pPr>
+            <a:endParaRPr/>
+          </a:p>
+        </p:txBody>
+      </p:sp>
+    </p:spTree>
+  </p:cSld>
+  <p:clrMapOvr>
+    <a:masterClrMapping/>
+  </p:clrMapOvr>
+</p:notes>
+</file>
+
+<file path=ppt/notesSlides/notesSlide11.xml><?xml version="1.0" encoding="utf-8"?>
+<p:notes xmlns:a="http://schemas.openxmlformats.org/drawingml/2006/main" xmlns:r="http://schemas.openxmlformats.org/officeDocument/2006/relationships" xmlns:p="http://schemas.openxmlformats.org/presentationml/2006/main" showMasterSp="0" showMasterPhAnim="0">
+  <p:cSld>
+    <p:spTree>
+      <p:nvGrpSpPr>
         <p:cNvPr id="1" name="Shape 122"/>
         <p:cNvGrpSpPr/>
         <p:nvPr/>
@@ -924,7 +1029,7 @@
 </p:notes>
 </file>
 
-<file path=ppt/notesSlides/notesSlide11.xml><?xml version="1.0" encoding="utf-8"?>
+<file path=ppt/notesSlides/notesSlide12.xml><?xml version="1.0" encoding="utf-8"?>
 <p:notes xmlns:a="http://schemas.openxmlformats.org/drawingml/2006/main" xmlns:r="http://schemas.openxmlformats.org/officeDocument/2006/relationships" xmlns:p="http://schemas.openxmlformats.org/presentationml/2006/main" showMasterSp="0" showMasterPhAnim="0">
   <p:cSld>
     <p:spTree>
@@ -1017,110 +1122,6 @@
               <a:buNone/>
             </a:pPr>
             <a:endParaRPr/>
-          </a:p>
-        </p:txBody>
-      </p:sp>
-    </p:spTree>
-  </p:cSld>
-  <p:clrMapOvr>
-    <a:masterClrMapping/>
-  </p:clrMapOvr>
-</p:notes>
-</file>
-
-<file path=ppt/notesSlides/notesSlide12.xml><?xml version="1.0" encoding="utf-8"?>
-<p:notes xmlns:a="http://schemas.openxmlformats.org/drawingml/2006/main" xmlns:r="http://schemas.openxmlformats.org/officeDocument/2006/relationships" xmlns:p="http://schemas.openxmlformats.org/presentationml/2006/main" showMasterSp="0" showMasterPhAnim="0">
-  <p:cSld>
-    <p:spTree>
-      <p:nvGrpSpPr>
-        <p:cNvPr id="1" name="Shape 186"/>
-        <p:cNvGrpSpPr/>
-        <p:nvPr/>
-      </p:nvGrpSpPr>
-      <p:grpSpPr>
-        <a:xfrm>
-          <a:off x="0" y="0"/>
-          <a:ext cx="0" cy="0"/>
-          <a:chOff x="0" y="0"/>
-          <a:chExt cx="0" cy="0"/>
-        </a:xfrm>
-      </p:grpSpPr>
-      <p:sp>
-        <p:nvSpPr>
-          <p:cNvPr id="187" name="Google Shape;187;g238b681e494_0_160:notes"/>
-          <p:cNvSpPr>
-            <a:spLocks noGrp="1" noRot="1" noChangeAspect="1"/>
-          </p:cNvSpPr>
-          <p:nvPr>
-            <p:ph type="sldImg" idx="2"/>
-          </p:nvPr>
-        </p:nvSpPr>
-        <p:spPr>
-          <a:xfrm>
-            <a:off x="381000" y="685800"/>
-            <a:ext cx="6096000" cy="3429000"/>
-          </a:xfrm>
-          <a:custGeom>
-            <a:avLst/>
-            <a:gdLst/>
-            <a:ahLst/>
-            <a:cxnLst/>
-            <a:rect l="l" t="t" r="r" b="b"/>
-            <a:pathLst>
-              <a:path w="120000" h="120000" extrusionOk="0">
-                <a:moveTo>
-                  <a:pt x="0" y="0"/>
-                </a:moveTo>
-                <a:lnTo>
-                  <a:pt x="120000" y="0"/>
-                </a:lnTo>
-                <a:lnTo>
-                  <a:pt x="120000" y="120000"/>
-                </a:lnTo>
-                <a:lnTo>
-                  <a:pt x="0" y="120000"/>
-                </a:lnTo>
-                <a:close/>
-              </a:path>
-            </a:pathLst>
-          </a:custGeom>
-        </p:spPr>
-      </p:sp>
-      <p:sp>
-        <p:nvSpPr>
-          <p:cNvPr id="188" name="Google Shape;188;g238b681e494_0_160:notes"/>
-          <p:cNvSpPr txBox="1">
-            <a:spLocks noGrp="1"/>
-          </p:cNvSpPr>
-          <p:nvPr>
-            <p:ph type="body" idx="1"/>
-          </p:nvPr>
-        </p:nvSpPr>
-        <p:spPr>
-          <a:xfrm>
-            <a:off x="685800" y="4343400"/>
-            <a:ext cx="5486400" cy="4114800"/>
-          </a:xfrm>
-          <a:prstGeom prst="rect">
-            <a:avLst/>
-          </a:prstGeom>
-        </p:spPr>
-        <p:txBody>
-          <a:bodyPr spcFirstLastPara="1" wrap="square" lIns="91425" tIns="91425" rIns="91425" bIns="91425" anchor="t" anchorCtr="0">
-            <a:noAutofit/>
-          </a:bodyPr>
-          <a:lstStyle/>
-          <a:p>
-            <a:pPr marL="0" lvl="0" indent="0" algn="l" rtl="0">
-              <a:spcBef>
-                <a:spcPts val="0"/>
-              </a:spcBef>
-              <a:spcAft>
-                <a:spcPts val="0"/>
-              </a:spcAft>
-              <a:buNone/>
-            </a:pPr>
-            <a:endParaRPr dirty="0"/>
           </a:p>
         </p:txBody>
       </p:sp>
@@ -1229,6 +1230,110 @@
         </p:txBody>
       </p:sp>
     </p:spTree>
+  </p:cSld>
+  <p:clrMapOvr>
+    <a:masterClrMapping/>
+  </p:clrMapOvr>
+</p:notes>
+</file>
+
+<file path=ppt/notesSlides/notesSlide14.xml><?xml version="1.0" encoding="utf-8"?>
+<p:notes xmlns:a="http://schemas.openxmlformats.org/drawingml/2006/main" xmlns:r="http://schemas.openxmlformats.org/officeDocument/2006/relationships" xmlns:p="http://schemas.openxmlformats.org/presentationml/2006/main" showMasterSp="0" showMasterPhAnim="0">
+  <p:cSld>
+    <p:spTree>
+      <p:nvGrpSpPr>
+        <p:cNvPr id="1" name="Shape 186"/>
+        <p:cNvGrpSpPr/>
+        <p:nvPr/>
+      </p:nvGrpSpPr>
+      <p:grpSpPr>
+        <a:xfrm>
+          <a:off x="0" y="0"/>
+          <a:ext cx="0" cy="0"/>
+          <a:chOff x="0" y="0"/>
+          <a:chExt cx="0" cy="0"/>
+        </a:xfrm>
+      </p:grpSpPr>
+      <p:sp>
+        <p:nvSpPr>
+          <p:cNvPr id="187" name="Google Shape;187;g238b681e494_0_160:notes"/>
+          <p:cNvSpPr>
+            <a:spLocks noGrp="1" noRot="1" noChangeAspect="1"/>
+          </p:cNvSpPr>
+          <p:nvPr>
+            <p:ph type="sldImg" idx="2"/>
+          </p:nvPr>
+        </p:nvSpPr>
+        <p:spPr>
+          <a:xfrm>
+            <a:off x="381000" y="685800"/>
+            <a:ext cx="6096000" cy="3429000"/>
+          </a:xfrm>
+          <a:custGeom>
+            <a:avLst/>
+            <a:gdLst/>
+            <a:ahLst/>
+            <a:cxnLst/>
+            <a:rect l="l" t="t" r="r" b="b"/>
+            <a:pathLst>
+              <a:path w="120000" h="120000" extrusionOk="0">
+                <a:moveTo>
+                  <a:pt x="0" y="0"/>
+                </a:moveTo>
+                <a:lnTo>
+                  <a:pt x="120000" y="0"/>
+                </a:lnTo>
+                <a:lnTo>
+                  <a:pt x="120000" y="120000"/>
+                </a:lnTo>
+                <a:lnTo>
+                  <a:pt x="0" y="120000"/>
+                </a:lnTo>
+                <a:close/>
+              </a:path>
+            </a:pathLst>
+          </a:custGeom>
+        </p:spPr>
+      </p:sp>
+      <p:sp>
+        <p:nvSpPr>
+          <p:cNvPr id="188" name="Google Shape;188;g238b681e494_0_160:notes"/>
+          <p:cNvSpPr txBox="1">
+            <a:spLocks noGrp="1"/>
+          </p:cNvSpPr>
+          <p:nvPr>
+            <p:ph type="body" idx="1"/>
+          </p:nvPr>
+        </p:nvSpPr>
+        <p:spPr>
+          <a:xfrm>
+            <a:off x="685800" y="4343400"/>
+            <a:ext cx="5486400" cy="4114800"/>
+          </a:xfrm>
+          <a:prstGeom prst="rect">
+            <a:avLst/>
+          </a:prstGeom>
+        </p:spPr>
+        <p:txBody>
+          <a:bodyPr spcFirstLastPara="1" wrap="square" lIns="91425" tIns="91425" rIns="91425" bIns="91425" anchor="t" anchorCtr="0">
+            <a:noAutofit/>
+          </a:bodyPr>
+          <a:lstStyle/>
+          <a:p>
+            <a:pPr marL="0" lvl="0" indent="0" algn="l" rtl="0">
+              <a:spcBef>
+                <a:spcPts val="0"/>
+              </a:spcBef>
+              <a:spcAft>
+                <a:spcPts val="0"/>
+              </a:spcAft>
+              <a:buNone/>
+            </a:pPr>
+            <a:endParaRPr dirty="0"/>
+          </a:p>
+        </p:txBody>
+      </p:sp>
+    </p:spTree>
     <p:extLst>
       <p:ext uri="{BB962C8B-B14F-4D97-AF65-F5344CB8AC3E}">
         <p14:creationId xmlns:p14="http://schemas.microsoft.com/office/powerpoint/2010/main" val="3076193805"/>
@@ -1241,7 +1346,7 @@
 </p:notes>
 </file>
 
-<file path=ppt/notesSlides/notesSlide14.xml><?xml version="1.0" encoding="utf-8"?>
+<file path=ppt/notesSlides/notesSlide15.xml><?xml version="1.0" encoding="utf-8"?>
 <p:notes xmlns:a="http://schemas.openxmlformats.org/drawingml/2006/main" xmlns:r="http://schemas.openxmlformats.org/officeDocument/2006/relationships" xmlns:p="http://schemas.openxmlformats.org/presentationml/2006/main" showMasterSp="0" showMasterPhAnim="0">
   <p:cSld>
     <p:spTree>
@@ -1345,7 +1450,7 @@
 </p:notes>
 </file>
 
-<file path=ppt/notesSlides/notesSlide15.xml><?xml version="1.0" encoding="utf-8"?>
+<file path=ppt/notesSlides/notesSlide16.xml><?xml version="1.0" encoding="utf-8"?>
 <p:notes xmlns:a="http://schemas.openxmlformats.org/drawingml/2006/main" xmlns:r="http://schemas.openxmlformats.org/officeDocument/2006/relationships" xmlns:p="http://schemas.openxmlformats.org/presentationml/2006/main" showMasterSp="0" showMasterPhAnim="0">
   <p:cSld>
     <p:spTree>
@@ -1449,7 +1554,7 @@
 </p:notes>
 </file>
 
-<file path=ppt/notesSlides/notesSlide16.xml><?xml version="1.0" encoding="utf-8"?>
+<file path=ppt/notesSlides/notesSlide17.xml><?xml version="1.0" encoding="utf-8"?>
 <p:notes xmlns:a="http://schemas.openxmlformats.org/drawingml/2006/main" xmlns:r="http://schemas.openxmlformats.org/officeDocument/2006/relationships" xmlns:p="http://schemas.openxmlformats.org/presentationml/2006/main" showMasterSp="0" showMasterPhAnim="0">
   <p:cSld>
     <p:spTree>
@@ -1662,6 +1767,115 @@
   <p:cSld>
     <p:spTree>
       <p:nvGrpSpPr>
+        <p:cNvPr id="1" name="Shape 59"/>
+        <p:cNvGrpSpPr/>
+        <p:nvPr/>
+      </p:nvGrpSpPr>
+      <p:grpSpPr>
+        <a:xfrm>
+          <a:off x="0" y="0"/>
+          <a:ext cx="0" cy="0"/>
+          <a:chOff x="0" y="0"/>
+          <a:chExt cx="0" cy="0"/>
+        </a:xfrm>
+      </p:grpSpPr>
+      <p:sp>
+        <p:nvSpPr>
+          <p:cNvPr id="60" name="Google Shape;60;g238b681e494_0_2:notes"/>
+          <p:cNvSpPr>
+            <a:spLocks noGrp="1" noRot="1" noChangeAspect="1"/>
+          </p:cNvSpPr>
+          <p:nvPr>
+            <p:ph type="sldImg" idx="2"/>
+          </p:nvPr>
+        </p:nvSpPr>
+        <p:spPr>
+          <a:xfrm>
+            <a:off x="381000" y="685800"/>
+            <a:ext cx="6096000" cy="3429000"/>
+          </a:xfrm>
+          <a:custGeom>
+            <a:avLst/>
+            <a:gdLst/>
+            <a:ahLst/>
+            <a:cxnLst/>
+            <a:rect l="l" t="t" r="r" b="b"/>
+            <a:pathLst>
+              <a:path w="120000" h="120000" extrusionOk="0">
+                <a:moveTo>
+                  <a:pt x="0" y="0"/>
+                </a:moveTo>
+                <a:lnTo>
+                  <a:pt x="120000" y="0"/>
+                </a:lnTo>
+                <a:lnTo>
+                  <a:pt x="120000" y="120000"/>
+                </a:lnTo>
+                <a:lnTo>
+                  <a:pt x="0" y="120000"/>
+                </a:lnTo>
+                <a:close/>
+              </a:path>
+            </a:pathLst>
+          </a:custGeom>
+        </p:spPr>
+      </p:sp>
+      <p:sp>
+        <p:nvSpPr>
+          <p:cNvPr id="61" name="Google Shape;61;g238b681e494_0_2:notes"/>
+          <p:cNvSpPr txBox="1">
+            <a:spLocks noGrp="1"/>
+          </p:cNvSpPr>
+          <p:nvPr>
+            <p:ph type="body" idx="1"/>
+          </p:nvPr>
+        </p:nvSpPr>
+        <p:spPr>
+          <a:xfrm>
+            <a:off x="685800" y="4343400"/>
+            <a:ext cx="5486400" cy="4114800"/>
+          </a:xfrm>
+          <a:prstGeom prst="rect">
+            <a:avLst/>
+          </a:prstGeom>
+        </p:spPr>
+        <p:txBody>
+          <a:bodyPr spcFirstLastPara="1" wrap="square" lIns="91425" tIns="91425" rIns="91425" bIns="91425" anchor="t" anchorCtr="0">
+            <a:noAutofit/>
+          </a:bodyPr>
+          <a:lstStyle/>
+          <a:p>
+            <a:pPr marL="0" lvl="0" indent="0" algn="l" rtl="0">
+              <a:spcBef>
+                <a:spcPts val="0"/>
+              </a:spcBef>
+              <a:spcAft>
+                <a:spcPts val="0"/>
+              </a:spcAft>
+              <a:buNone/>
+            </a:pPr>
+            <a:endParaRPr/>
+          </a:p>
+        </p:txBody>
+      </p:sp>
+    </p:spTree>
+    <p:extLst>
+      <p:ext uri="{BB962C8B-B14F-4D97-AF65-F5344CB8AC3E}">
+        <p14:creationId xmlns:p14="http://schemas.microsoft.com/office/powerpoint/2010/main" val="989675563"/>
+      </p:ext>
+    </p:extLst>
+  </p:cSld>
+  <p:clrMapOvr>
+    <a:masterClrMapping/>
+  </p:clrMapOvr>
+</p:notes>
+</file>
+
+<file path=ppt/notesSlides/notesSlide4.xml><?xml version="1.0" encoding="utf-8"?>
+<p:notes xmlns:a="http://schemas.openxmlformats.org/drawingml/2006/main" xmlns:r="http://schemas.openxmlformats.org/officeDocument/2006/relationships" xmlns:p="http://schemas.openxmlformats.org/presentationml/2006/main" showMasterSp="0" showMasterPhAnim="0">
+  <p:cSld>
+    <p:spTree>
+      <p:nvGrpSpPr>
         <p:cNvPr id="1" name="Shape 72"/>
         <p:cNvGrpSpPr/>
         <p:nvPr/>
@@ -1761,7 +1975,7 @@
 </p:notes>
 </file>
 
-<file path=ppt/notesSlides/notesSlide4.xml><?xml version="1.0" encoding="utf-8"?>
+<file path=ppt/notesSlides/notesSlide5.xml><?xml version="1.0" encoding="utf-8"?>
 <p:notes xmlns:a="http://schemas.openxmlformats.org/drawingml/2006/main" xmlns:r="http://schemas.openxmlformats.org/officeDocument/2006/relationships" xmlns:p="http://schemas.openxmlformats.org/presentationml/2006/main" showMasterSp="0" showMasterPhAnim="0">
   <p:cSld>
     <p:spTree>
@@ -1865,7 +2079,7 @@
 </p:notes>
 </file>
 
-<file path=ppt/notesSlides/notesSlide5.xml><?xml version="1.0" encoding="utf-8"?>
+<file path=ppt/notesSlides/notesSlide6.xml><?xml version="1.0" encoding="utf-8"?>
 <p:notes xmlns:a="http://schemas.openxmlformats.org/drawingml/2006/main" xmlns:r="http://schemas.openxmlformats.org/officeDocument/2006/relationships" xmlns:p="http://schemas.openxmlformats.org/presentationml/2006/main" showMasterSp="0" showMasterPhAnim="0">
   <p:cSld>
     <p:spTree>
@@ -1969,7 +2183,7 @@
 </p:notes>
 </file>
 
-<file path=ppt/notesSlides/notesSlide6.xml><?xml version="1.0" encoding="utf-8"?>
+<file path=ppt/notesSlides/notesSlide7.xml><?xml version="1.0" encoding="utf-8"?>
 <p:notes xmlns:a="http://schemas.openxmlformats.org/drawingml/2006/main" xmlns:r="http://schemas.openxmlformats.org/officeDocument/2006/relationships" xmlns:p="http://schemas.openxmlformats.org/presentationml/2006/main" showMasterSp="0" showMasterPhAnim="0">
   <p:cSld>
     <p:spTree>
@@ -2073,7 +2287,7 @@
 </p:notes>
 </file>
 
-<file path=ppt/notesSlides/notesSlide7.xml><?xml version="1.0" encoding="utf-8"?>
+<file path=ppt/notesSlides/notesSlide8.xml><?xml version="1.0" encoding="utf-8"?>
 <p:notes xmlns:a="http://schemas.openxmlformats.org/drawingml/2006/main" xmlns:r="http://schemas.openxmlformats.org/officeDocument/2006/relationships" xmlns:p="http://schemas.openxmlformats.org/presentationml/2006/main" showMasterSp="0" showMasterPhAnim="0">
   <p:cSld>
     <p:spTree>
@@ -2177,7 +2391,7 @@
 </p:notes>
 </file>
 
-<file path=ppt/notesSlides/notesSlide8.xml><?xml version="1.0" encoding="utf-8"?>
+<file path=ppt/notesSlides/notesSlide9.xml><?xml version="1.0" encoding="utf-8"?>
 <p:notes xmlns:a="http://schemas.openxmlformats.org/drawingml/2006/main" xmlns:r="http://schemas.openxmlformats.org/officeDocument/2006/relationships" xmlns:p="http://schemas.openxmlformats.org/presentationml/2006/main" showMasterSp="0" showMasterPhAnim="0">
   <p:cSld>
     <p:spTree>
@@ -2238,110 +2452,6 @@
       <p:sp>
         <p:nvSpPr>
           <p:cNvPr id="108" name="Google Shape;108;g238b681e494_0_77:notes"/>
-          <p:cNvSpPr txBox="1">
-            <a:spLocks noGrp="1"/>
-          </p:cNvSpPr>
-          <p:nvPr>
-            <p:ph type="body" idx="1"/>
-          </p:nvPr>
-        </p:nvSpPr>
-        <p:spPr>
-          <a:xfrm>
-            <a:off x="685800" y="4343400"/>
-            <a:ext cx="5486400" cy="4114800"/>
-          </a:xfrm>
-          <a:prstGeom prst="rect">
-            <a:avLst/>
-          </a:prstGeom>
-        </p:spPr>
-        <p:txBody>
-          <a:bodyPr spcFirstLastPara="1" wrap="square" lIns="91425" tIns="91425" rIns="91425" bIns="91425" anchor="t" anchorCtr="0">
-            <a:noAutofit/>
-          </a:bodyPr>
-          <a:lstStyle/>
-          <a:p>
-            <a:pPr marL="0" lvl="0" indent="0" algn="l" rtl="0">
-              <a:spcBef>
-                <a:spcPts val="0"/>
-              </a:spcBef>
-              <a:spcAft>
-                <a:spcPts val="0"/>
-              </a:spcAft>
-              <a:buNone/>
-            </a:pPr>
-            <a:endParaRPr/>
-          </a:p>
-        </p:txBody>
-      </p:sp>
-    </p:spTree>
-  </p:cSld>
-  <p:clrMapOvr>
-    <a:masterClrMapping/>
-  </p:clrMapOvr>
-</p:notes>
-</file>
-
-<file path=ppt/notesSlides/notesSlide9.xml><?xml version="1.0" encoding="utf-8"?>
-<p:notes xmlns:a="http://schemas.openxmlformats.org/drawingml/2006/main" xmlns:r="http://schemas.openxmlformats.org/officeDocument/2006/relationships" xmlns:p="http://schemas.openxmlformats.org/presentationml/2006/main" showMasterSp="0" showMasterPhAnim="0">
-  <p:cSld>
-    <p:spTree>
-      <p:nvGrpSpPr>
-        <p:cNvPr id="1" name="Shape 114"/>
-        <p:cNvGrpSpPr/>
-        <p:nvPr/>
-      </p:nvGrpSpPr>
-      <p:grpSpPr>
-        <a:xfrm>
-          <a:off x="0" y="0"/>
-          <a:ext cx="0" cy="0"/>
-          <a:chOff x="0" y="0"/>
-          <a:chExt cx="0" cy="0"/>
-        </a:xfrm>
-      </p:grpSpPr>
-      <p:sp>
-        <p:nvSpPr>
-          <p:cNvPr id="115" name="Google Shape;115;g238b681e494_0_42:notes"/>
-          <p:cNvSpPr>
-            <a:spLocks noGrp="1" noRot="1" noChangeAspect="1"/>
-          </p:cNvSpPr>
-          <p:nvPr>
-            <p:ph type="sldImg" idx="2"/>
-          </p:nvPr>
-        </p:nvSpPr>
-        <p:spPr>
-          <a:xfrm>
-            <a:off x="381000" y="685800"/>
-            <a:ext cx="6096000" cy="3429000"/>
-          </a:xfrm>
-          <a:custGeom>
-            <a:avLst/>
-            <a:gdLst/>
-            <a:ahLst/>
-            <a:cxnLst/>
-            <a:rect l="l" t="t" r="r" b="b"/>
-            <a:pathLst>
-              <a:path w="120000" h="120000" extrusionOk="0">
-                <a:moveTo>
-                  <a:pt x="0" y="0"/>
-                </a:moveTo>
-                <a:lnTo>
-                  <a:pt x="120000" y="0"/>
-                </a:lnTo>
-                <a:lnTo>
-                  <a:pt x="120000" y="120000"/>
-                </a:lnTo>
-                <a:lnTo>
-                  <a:pt x="0" y="120000"/>
-                </a:lnTo>
-                <a:close/>
-              </a:path>
-            </a:pathLst>
-          </a:custGeom>
-        </p:spPr>
-      </p:sp>
-      <p:sp>
-        <p:nvSpPr>
-          <p:cNvPr id="116" name="Google Shape;116;g238b681e494_0_42:notes"/>
           <p:cNvSpPr txBox="1">
             <a:spLocks noGrp="1"/>
           </p:cNvSpPr>
@@ -7377,6 +7487,348 @@
   <p:cSld>
     <p:spTree>
       <p:nvGrpSpPr>
+        <p:cNvPr id="1" name="Shape 117"/>
+        <p:cNvGrpSpPr/>
+        <p:nvPr/>
+      </p:nvGrpSpPr>
+      <p:grpSpPr>
+        <a:xfrm>
+          <a:off x="0" y="0"/>
+          <a:ext cx="0" cy="0"/>
+          <a:chOff x="0" y="0"/>
+          <a:chExt cx="0" cy="0"/>
+        </a:xfrm>
+      </p:grpSpPr>
+      <p:pic>
+        <p:nvPicPr>
+          <p:cNvPr id="119" name="Google Shape;119;p21"/>
+          <p:cNvPicPr preferRelativeResize="0"/>
+          <p:nvPr/>
+        </p:nvPicPr>
+        <p:blipFill>
+          <a:blip r:embed="rId3">
+            <a:alphaModFix/>
+          </a:blip>
+          <a:stretch>
+            <a:fillRect/>
+          </a:stretch>
+        </p:blipFill>
+        <p:spPr>
+          <a:xfrm>
+            <a:off x="6364585" y="260689"/>
+            <a:ext cx="2494874" cy="382110"/>
+          </a:xfrm>
+          <a:prstGeom prst="rect">
+            <a:avLst/>
+          </a:prstGeom>
+          <a:noFill/>
+          <a:ln>
+            <a:noFill/>
+          </a:ln>
+        </p:spPr>
+      </p:pic>
+      <p:pic>
+        <p:nvPicPr>
+          <p:cNvPr id="5" name="Picture 4" descr="Map&#10;&#10;Description automatically generated">
+            <a:extLst>
+              <a:ext uri="{FF2B5EF4-FFF2-40B4-BE49-F238E27FC236}">
+                <a16:creationId xmlns:a16="http://schemas.microsoft.com/office/drawing/2014/main" id="{145EC531-7E5A-8440-873B-3930BB652289}"/>
+              </a:ext>
+            </a:extLst>
+          </p:cNvPr>
+          <p:cNvPicPr>
+            <a:picLocks noChangeAspect="1"/>
+          </p:cNvPicPr>
+          <p:nvPr/>
+        </p:nvPicPr>
+        <p:blipFill>
+          <a:blip r:embed="rId4"/>
+          <a:stretch>
+            <a:fillRect/>
+          </a:stretch>
+        </p:blipFill>
+        <p:spPr>
+          <a:xfrm>
+            <a:off x="126752" y="917107"/>
+            <a:ext cx="3550429" cy="3012097"/>
+          </a:xfrm>
+          <a:prstGeom prst="rect">
+            <a:avLst/>
+          </a:prstGeom>
+        </p:spPr>
+      </p:pic>
+      <p:sp>
+        <p:nvSpPr>
+          <p:cNvPr id="6" name="TextBox 5">
+            <a:extLst>
+              <a:ext uri="{FF2B5EF4-FFF2-40B4-BE49-F238E27FC236}">
+                <a16:creationId xmlns:a16="http://schemas.microsoft.com/office/drawing/2014/main" id="{BDC49DCF-6AA9-254F-A9B6-14A1ED31BCD3}"/>
+              </a:ext>
+            </a:extLst>
+          </p:cNvPr>
+          <p:cNvSpPr txBox="1"/>
+          <p:nvPr/>
+        </p:nvSpPr>
+        <p:spPr>
+          <a:xfrm>
+            <a:off x="117692" y="3944501"/>
+            <a:ext cx="3935016" cy="292388"/>
+          </a:xfrm>
+          <a:prstGeom prst="rect">
+            <a:avLst/>
+          </a:prstGeom>
+          <a:noFill/>
+        </p:spPr>
+        <p:txBody>
+          <a:bodyPr wrap="square" rtlCol="0">
+            <a:spAutoFit/>
+          </a:bodyPr>
+          <a:lstStyle/>
+          <a:p>
+            <a:r>
+              <a:rPr lang="en-NG" sz="1300" dirty="0">
+                <a:latin typeface="PT Sans" panose="020B0503020203020204" pitchFamily="34" charset="77"/>
+              </a:rPr>
+              <a:t>Heatmap </a:t>
+            </a:r>
+            <a:r>
+              <a:rPr lang="en-NG" sz="1300">
+                <a:latin typeface="PT Sans" panose="020B0503020203020204" pitchFamily="34" charset="77"/>
+              </a:rPr>
+              <a:t>representing Hotspots </a:t>
+            </a:r>
+            <a:r>
+              <a:rPr lang="en-NG" sz="1300" dirty="0">
+                <a:latin typeface="PT Sans" panose="020B0503020203020204" pitchFamily="34" charset="77"/>
+              </a:rPr>
+              <a:t>of Crime in 2022</a:t>
+            </a:r>
+          </a:p>
+        </p:txBody>
+      </p:sp>
+      <p:pic>
+        <p:nvPicPr>
+          <p:cNvPr id="8" name="Picture 7" descr="Chart&#10;&#10;Description automatically generated with medium confidence">
+            <a:extLst>
+              <a:ext uri="{FF2B5EF4-FFF2-40B4-BE49-F238E27FC236}">
+                <a16:creationId xmlns:a16="http://schemas.microsoft.com/office/drawing/2014/main" id="{0FDE1E62-A3B2-5541-B652-CE103ECDEE88}"/>
+              </a:ext>
+            </a:extLst>
+          </p:cNvPr>
+          <p:cNvPicPr>
+            <a:picLocks noChangeAspect="1"/>
+          </p:cNvPicPr>
+          <p:nvPr/>
+        </p:nvPicPr>
+        <p:blipFill>
+          <a:blip r:embed="rId5"/>
+          <a:stretch>
+            <a:fillRect/>
+          </a:stretch>
+        </p:blipFill>
+        <p:spPr>
+          <a:xfrm>
+            <a:off x="3804540" y="917107"/>
+            <a:ext cx="2609313" cy="2622798"/>
+          </a:xfrm>
+          <a:prstGeom prst="rect">
+            <a:avLst/>
+          </a:prstGeom>
+        </p:spPr>
+      </p:pic>
+      <p:pic>
+        <p:nvPicPr>
+          <p:cNvPr id="10" name="Picture 9" descr="A picture containing chart&#10;&#10;Description automatically generated">
+            <a:extLst>
+              <a:ext uri="{FF2B5EF4-FFF2-40B4-BE49-F238E27FC236}">
+                <a16:creationId xmlns:a16="http://schemas.microsoft.com/office/drawing/2014/main" id="{AC484524-16A8-0349-8068-6F99609A4747}"/>
+              </a:ext>
+            </a:extLst>
+          </p:cNvPr>
+          <p:cNvPicPr>
+            <a:picLocks noChangeAspect="1"/>
+          </p:cNvPicPr>
+          <p:nvPr/>
+        </p:nvPicPr>
+        <p:blipFill>
+          <a:blip r:embed="rId6"/>
+          <a:stretch>
+            <a:fillRect/>
+          </a:stretch>
+        </p:blipFill>
+        <p:spPr>
+          <a:xfrm>
+            <a:off x="6481352" y="911211"/>
+            <a:ext cx="2631884" cy="3305647"/>
+          </a:xfrm>
+          <a:prstGeom prst="rect">
+            <a:avLst/>
+          </a:prstGeom>
+        </p:spPr>
+      </p:pic>
+      <p:cxnSp>
+        <p:nvCxnSpPr>
+          <p:cNvPr id="12" name="Straight Connector 11">
+            <a:extLst>
+              <a:ext uri="{FF2B5EF4-FFF2-40B4-BE49-F238E27FC236}">
+                <a16:creationId xmlns:a16="http://schemas.microsoft.com/office/drawing/2014/main" id="{E01A5F9B-A492-7847-8BE4-75028A5D6A2B}"/>
+              </a:ext>
+            </a:extLst>
+          </p:cNvPr>
+          <p:cNvCxnSpPr>
+            <a:cxnSpLocks/>
+          </p:cNvCxnSpPr>
+          <p:nvPr/>
+        </p:nvCxnSpPr>
+        <p:spPr>
+          <a:xfrm flipV="1">
+            <a:off x="3767618" y="760495"/>
+            <a:ext cx="32457" cy="3384000"/>
+          </a:xfrm>
+          <a:prstGeom prst="line">
+            <a:avLst/>
+          </a:prstGeom>
+        </p:spPr>
+        <p:style>
+          <a:lnRef idx="1">
+            <a:schemeClr val="accent1"/>
+          </a:lnRef>
+          <a:fillRef idx="0">
+            <a:schemeClr val="accent1"/>
+          </a:fillRef>
+          <a:effectRef idx="0">
+            <a:schemeClr val="accent1"/>
+          </a:effectRef>
+          <a:fontRef idx="minor">
+            <a:schemeClr val="tx1"/>
+          </a:fontRef>
+        </p:style>
+      </p:cxnSp>
+      <p:cxnSp>
+        <p:nvCxnSpPr>
+          <p:cNvPr id="20" name="Straight Connector 19">
+            <a:extLst>
+              <a:ext uri="{FF2B5EF4-FFF2-40B4-BE49-F238E27FC236}">
+                <a16:creationId xmlns:a16="http://schemas.microsoft.com/office/drawing/2014/main" id="{63A76207-6E13-D044-BDDA-16A82DC69076}"/>
+              </a:ext>
+            </a:extLst>
+          </p:cNvPr>
+          <p:cNvCxnSpPr>
+            <a:cxnSpLocks/>
+          </p:cNvCxnSpPr>
+          <p:nvPr/>
+        </p:nvCxnSpPr>
+        <p:spPr>
+          <a:xfrm flipV="1">
+            <a:off x="6458046" y="760494"/>
+            <a:ext cx="5200" cy="3384000"/>
+          </a:xfrm>
+          <a:prstGeom prst="line">
+            <a:avLst/>
+          </a:prstGeom>
+        </p:spPr>
+        <p:style>
+          <a:lnRef idx="1">
+            <a:schemeClr val="accent1"/>
+          </a:lnRef>
+          <a:fillRef idx="0">
+            <a:schemeClr val="accent1"/>
+          </a:fillRef>
+          <a:effectRef idx="0">
+            <a:schemeClr val="accent1"/>
+          </a:effectRef>
+          <a:fontRef idx="minor">
+            <a:schemeClr val="tx1"/>
+          </a:fontRef>
+        </p:style>
+      </p:cxnSp>
+      <p:sp>
+        <p:nvSpPr>
+          <p:cNvPr id="33" name="TextBox 32">
+            <a:extLst>
+              <a:ext uri="{FF2B5EF4-FFF2-40B4-BE49-F238E27FC236}">
+                <a16:creationId xmlns:a16="http://schemas.microsoft.com/office/drawing/2014/main" id="{7626A5DB-3046-EB49-A8D5-6919891CB165}"/>
+              </a:ext>
+            </a:extLst>
+          </p:cNvPr>
+          <p:cNvSpPr txBox="1"/>
+          <p:nvPr/>
+        </p:nvSpPr>
+        <p:spPr>
+          <a:xfrm>
+            <a:off x="3998390" y="3932185"/>
+            <a:ext cx="2107435" cy="292388"/>
+          </a:xfrm>
+          <a:prstGeom prst="rect">
+            <a:avLst/>
+          </a:prstGeom>
+          <a:noFill/>
+        </p:spPr>
+        <p:txBody>
+          <a:bodyPr wrap="square" rtlCol="0">
+            <a:spAutoFit/>
+          </a:bodyPr>
+          <a:lstStyle/>
+          <a:p>
+            <a:r>
+              <a:rPr lang="en-NG" sz="1300" dirty="0">
+                <a:latin typeface="PT Sans" panose="020B0503020203020204" pitchFamily="34" charset="77"/>
+              </a:rPr>
+              <a:t>Top Countries in crime rate</a:t>
+            </a:r>
+          </a:p>
+        </p:txBody>
+      </p:sp>
+      <p:sp>
+        <p:nvSpPr>
+          <p:cNvPr id="34" name="TextBox 33">
+            <a:extLst>
+              <a:ext uri="{FF2B5EF4-FFF2-40B4-BE49-F238E27FC236}">
+                <a16:creationId xmlns:a16="http://schemas.microsoft.com/office/drawing/2014/main" id="{80D79638-A515-4340-A198-6FC550E8E74C}"/>
+              </a:ext>
+            </a:extLst>
+          </p:cNvPr>
+          <p:cNvSpPr txBox="1"/>
+          <p:nvPr/>
+        </p:nvSpPr>
+        <p:spPr>
+          <a:xfrm>
+            <a:off x="6458046" y="3924470"/>
+            <a:ext cx="2437629" cy="292388"/>
+          </a:xfrm>
+          <a:prstGeom prst="rect">
+            <a:avLst/>
+          </a:prstGeom>
+          <a:noFill/>
+        </p:spPr>
+        <p:txBody>
+          <a:bodyPr wrap="square" rtlCol="0">
+            <a:spAutoFit/>
+          </a:bodyPr>
+          <a:lstStyle/>
+          <a:p>
+            <a:r>
+              <a:rPr lang="en-NG" sz="1300" dirty="0">
+                <a:latin typeface="PT Sans" panose="020B0503020203020204" pitchFamily="34" charset="77"/>
+              </a:rPr>
+              <a:t>Bottom Countries in crime rate</a:t>
+            </a:r>
+          </a:p>
+        </p:txBody>
+      </p:sp>
+    </p:spTree>
+  </p:cSld>
+  <p:clrMapOvr>
+    <a:masterClrMapping/>
+  </p:clrMapOvr>
+</p:sld>
+</file>
+
+<file path=ppt/slides/slide11.xml><?xml version="1.0" encoding="utf-8"?>
+<p:sld xmlns:a="http://schemas.openxmlformats.org/drawingml/2006/main" xmlns:r="http://schemas.openxmlformats.org/officeDocument/2006/relationships" xmlns:p="http://schemas.openxmlformats.org/presentationml/2006/main">
+  <p:cSld>
+    <p:spTree>
+      <p:nvGrpSpPr>
         <p:cNvPr id="1" name="Shape 125"/>
         <p:cNvGrpSpPr/>
         <p:nvPr/>
@@ -7671,7 +8123,7 @@
 </p:sld>
 </file>
 
-<file path=ppt/slides/slide11.xml><?xml version="1.0" encoding="utf-8"?>
+<file path=ppt/slides/slide12.xml><?xml version="1.0" encoding="utf-8"?>
 <p:sld xmlns:a="http://schemas.openxmlformats.org/drawingml/2006/main" xmlns:r="http://schemas.openxmlformats.org/officeDocument/2006/relationships" xmlns:p="http://schemas.openxmlformats.org/presentationml/2006/main">
   <p:cSld>
     <p:spTree>
@@ -7861,7 +8313,7 @@
 </p:sld>
 </file>
 
-<file path=ppt/slides/slide12.xml><?xml version="1.0" encoding="utf-8"?>
+<file path=ppt/slides/slide13.xml><?xml version="1.0" encoding="utf-8"?>
 <p:sld xmlns:a="http://schemas.openxmlformats.org/drawingml/2006/main" xmlns:r="http://schemas.openxmlformats.org/officeDocument/2006/relationships" xmlns:p="http://schemas.openxmlformats.org/presentationml/2006/main">
   <p:cSld>
     <p:spTree>
@@ -8122,7 +8574,7 @@
 </p:sld>
 </file>
 
-<file path=ppt/slides/slide13.xml><?xml version="1.0" encoding="utf-8"?>
+<file path=ppt/slides/slide14.xml><?xml version="1.0" encoding="utf-8"?>
 <p:sld xmlns:a="http://schemas.openxmlformats.org/drawingml/2006/main" xmlns:r="http://schemas.openxmlformats.org/officeDocument/2006/relationships" xmlns:p="http://schemas.openxmlformats.org/presentationml/2006/main">
   <p:cSld>
     <p:spTree>
@@ -8359,7 +8811,7 @@
 </p:sld>
 </file>
 
-<file path=ppt/slides/slide14.xml><?xml version="1.0" encoding="utf-8"?>
+<file path=ppt/slides/slide15.xml><?xml version="1.0" encoding="utf-8"?>
 <p:sld xmlns:a="http://schemas.openxmlformats.org/drawingml/2006/main" xmlns:r="http://schemas.openxmlformats.org/officeDocument/2006/relationships" xmlns:p="http://schemas.openxmlformats.org/presentationml/2006/main">
   <p:cSld>
     <p:spTree>
@@ -8719,7 +9171,7 @@
 </p:sld>
 </file>
 
-<file path=ppt/slides/slide15.xml><?xml version="1.0" encoding="utf-8"?>
+<file path=ppt/slides/slide16.xml><?xml version="1.0" encoding="utf-8"?>
 <p:sld xmlns:a="http://schemas.openxmlformats.org/drawingml/2006/main" xmlns:r="http://schemas.openxmlformats.org/officeDocument/2006/relationships" xmlns:p="http://schemas.openxmlformats.org/presentationml/2006/main">
   <p:cSld>
     <p:spTree>
@@ -8893,7 +9345,7 @@
 </p:sld>
 </file>
 
-<file path=ppt/slides/slide16.xml><?xml version="1.0" encoding="utf-8"?>
+<file path=ppt/slides/slide17.xml><?xml version="1.0" encoding="utf-8"?>
 <p:sld xmlns:a="http://schemas.openxmlformats.org/drawingml/2006/main" xmlns:r="http://schemas.openxmlformats.org/officeDocument/2006/relationships" xmlns:p="http://schemas.openxmlformats.org/presentationml/2006/main">
   <p:cSld>
     <p:spTree>
@@ -9659,6 +10111,225 @@
   <p:cSld>
     <p:spTree>
       <p:nvGrpSpPr>
+        <p:cNvPr id="1" name="Shape 62"/>
+        <p:cNvGrpSpPr/>
+        <p:nvPr/>
+      </p:nvGrpSpPr>
+      <p:grpSpPr>
+        <a:xfrm>
+          <a:off x="0" y="0"/>
+          <a:ext cx="0" cy="0"/>
+          <a:chOff x="0" y="0"/>
+          <a:chExt cx="0" cy="0"/>
+        </a:xfrm>
+      </p:grpSpPr>
+      <p:pic>
+        <p:nvPicPr>
+          <p:cNvPr id="64" name="Google Shape;64;p14"/>
+          <p:cNvPicPr preferRelativeResize="0"/>
+          <p:nvPr/>
+        </p:nvPicPr>
+        <p:blipFill>
+          <a:blip r:embed="rId3">
+            <a:alphaModFix/>
+          </a:blip>
+          <a:stretch>
+            <a:fillRect/>
+          </a:stretch>
+        </p:blipFill>
+        <p:spPr>
+          <a:xfrm>
+            <a:off x="6391364" y="296900"/>
+            <a:ext cx="2440937" cy="395600"/>
+          </a:xfrm>
+          <a:prstGeom prst="rect">
+            <a:avLst/>
+          </a:prstGeom>
+          <a:noFill/>
+          <a:ln>
+            <a:noFill/>
+          </a:ln>
+        </p:spPr>
+      </p:pic>
+      <p:sp>
+        <p:nvSpPr>
+          <p:cNvPr id="67" name="Google Shape;67;p14"/>
+          <p:cNvSpPr txBox="1">
+            <a:spLocks noGrp="1"/>
+          </p:cNvSpPr>
+          <p:nvPr>
+            <p:ph type="subTitle" idx="1"/>
+          </p:nvPr>
+        </p:nvSpPr>
+        <p:spPr>
+          <a:xfrm>
+            <a:off x="205151" y="595373"/>
+            <a:ext cx="3280434" cy="447600"/>
+          </a:xfrm>
+          <a:prstGeom prst="rect">
+            <a:avLst/>
+          </a:prstGeom>
+        </p:spPr>
+        <p:txBody>
+          <a:bodyPr spcFirstLastPara="1" wrap="square" lIns="91425" tIns="91425" rIns="91425" bIns="91425" anchor="t" anchorCtr="0">
+            <a:noAutofit/>
+          </a:bodyPr>
+          <a:lstStyle/>
+          <a:p>
+            <a:pPr marL="0" lvl="0" indent="0" algn="l" rtl="0">
+              <a:lnSpc>
+                <a:spcPct val="80000"/>
+              </a:lnSpc>
+              <a:spcBef>
+                <a:spcPts val="0"/>
+              </a:spcBef>
+              <a:spcAft>
+                <a:spcPts val="0"/>
+              </a:spcAft>
+              <a:buNone/>
+            </a:pPr>
+            <a:r>
+              <a:rPr lang="en" sz="3400" b="1" dirty="0">
+                <a:solidFill>
+                  <a:schemeClr val="tx1"/>
+                </a:solidFill>
+                <a:latin typeface="PT Sans" panose="020B0503020203020204" pitchFamily="34" charset="77"/>
+                <a:cs typeface="Times New Roman" panose="02020603050405020304" pitchFamily="18" charset="0"/>
+              </a:rPr>
+              <a:t>INTRODUCTION</a:t>
+            </a:r>
+            <a:endParaRPr sz="3400" b="1" dirty="0">
+              <a:solidFill>
+                <a:schemeClr val="tx1"/>
+              </a:solidFill>
+              <a:latin typeface="PT Sans" panose="020B0503020203020204" pitchFamily="34" charset="77"/>
+              <a:cs typeface="Times New Roman" panose="02020603050405020304" pitchFamily="18" charset="0"/>
+            </a:endParaRPr>
+          </a:p>
+        </p:txBody>
+      </p:sp>
+      <p:sp>
+        <p:nvSpPr>
+          <p:cNvPr id="71" name="Google Shape;71;p14"/>
+          <p:cNvSpPr txBox="1">
+            <a:spLocks noGrp="1"/>
+          </p:cNvSpPr>
+          <p:nvPr>
+            <p:ph type="subTitle" idx="1"/>
+          </p:nvPr>
+        </p:nvSpPr>
+        <p:spPr>
+          <a:xfrm>
+            <a:off x="205151" y="1205935"/>
+            <a:ext cx="5299356" cy="2161825"/>
+          </a:xfrm>
+          <a:prstGeom prst="rect">
+            <a:avLst/>
+          </a:prstGeom>
+        </p:spPr>
+        <p:txBody>
+          <a:bodyPr spcFirstLastPara="1" wrap="square" lIns="91425" tIns="91425" rIns="91425" bIns="91425" anchor="t" anchorCtr="0">
+            <a:noAutofit/>
+          </a:bodyPr>
+          <a:lstStyle/>
+          <a:p>
+            <a:pPr marL="0" lvl="0" indent="0" algn="l">
+              <a:lnSpc>
+                <a:spcPct val="114000"/>
+              </a:lnSpc>
+            </a:pPr>
+            <a:r>
+              <a:rPr lang="en-GB" sz="1700" dirty="0">
+                <a:solidFill>
+                  <a:schemeClr val="tx1"/>
+                </a:solidFill>
+                <a:latin typeface="PT Sans" panose="020B0503020203020204" pitchFamily="34" charset="77"/>
+                <a:cs typeface="Times New Roman" panose="02020603050405020304" pitchFamily="18" charset="0"/>
+              </a:rPr>
+              <a:t>A crime is a form of violence or illegal act performed by perpetrator(s) against another in order to cause harm to person or property which is punishable by the authority. Directly or indirectly, crime affects people's lives. It is a major variable that affects the development of a country.</a:t>
+            </a:r>
+          </a:p>
+          <a:p>
+            <a:pPr marL="0" lvl="0" indent="0" algn="l">
+              <a:lnSpc>
+                <a:spcPct val="114000"/>
+              </a:lnSpc>
+            </a:pPr>
+            <a:endParaRPr lang="en-GB" sz="1700" dirty="0">
+              <a:solidFill>
+                <a:schemeClr val="tx1"/>
+              </a:solidFill>
+              <a:latin typeface="PT Sans" panose="020B0503020203020204" pitchFamily="34" charset="77"/>
+              <a:cs typeface="Times New Roman" panose="02020603050405020304" pitchFamily="18" charset="0"/>
+            </a:endParaRPr>
+          </a:p>
+          <a:p>
+            <a:pPr marL="0" lvl="0" indent="0" algn="l">
+              <a:lnSpc>
+                <a:spcPct val="114000"/>
+              </a:lnSpc>
+            </a:pPr>
+            <a:r>
+              <a:rPr lang="en-GB" sz="1700" dirty="0">
+                <a:solidFill>
+                  <a:schemeClr val="tx1"/>
+                </a:solidFill>
+                <a:latin typeface="PT Sans" panose="020B0503020203020204" pitchFamily="34" charset="77"/>
+                <a:cs typeface="Times New Roman" panose="02020603050405020304" pitchFamily="18" charset="0"/>
+              </a:rPr>
+              <a:t>Crimes in African nations keep rising which span from a range of violent and non-violent actions by political agents, including governments, rebels, militias, identity groups, political parties, external actors, rioters, protesters and civilians.</a:t>
+            </a:r>
+          </a:p>
+        </p:txBody>
+      </p:sp>
+      <p:pic>
+        <p:nvPicPr>
+          <p:cNvPr id="4" name="Picture 3" descr="A picture containing road, person, outdoor, car&#10;&#10;Description automatically generated">
+            <a:extLst>
+              <a:ext uri="{FF2B5EF4-FFF2-40B4-BE49-F238E27FC236}">
+                <a16:creationId xmlns:a16="http://schemas.microsoft.com/office/drawing/2014/main" id="{CCCB9DD2-CCA8-4442-9DBD-0A814F225F31}"/>
+              </a:ext>
+            </a:extLst>
+          </p:cNvPr>
+          <p:cNvPicPr>
+            <a:picLocks noChangeAspect="1"/>
+          </p:cNvPicPr>
+          <p:nvPr/>
+        </p:nvPicPr>
+        <p:blipFill>
+          <a:blip r:embed="rId4"/>
+          <a:stretch>
+            <a:fillRect/>
+          </a:stretch>
+        </p:blipFill>
+        <p:spPr>
+          <a:xfrm>
+            <a:off x="5633202" y="1205935"/>
+            <a:ext cx="3305647" cy="3305647"/>
+          </a:xfrm>
+          <a:prstGeom prst="rect">
+            <a:avLst/>
+          </a:prstGeom>
+        </p:spPr>
+      </p:pic>
+    </p:spTree>
+    <p:extLst>
+      <p:ext uri="{BB962C8B-B14F-4D97-AF65-F5344CB8AC3E}">
+        <p14:creationId xmlns:p14="http://schemas.microsoft.com/office/powerpoint/2010/main" val="3119477040"/>
+      </p:ext>
+    </p:extLst>
+  </p:cSld>
+  <p:clrMapOvr>
+    <a:masterClrMapping/>
+  </p:clrMapOvr>
+</p:sld>
+</file>
+
+<file path=ppt/slides/slide4.xml><?xml version="1.0" encoding="utf-8"?>
+<p:sld xmlns:a="http://schemas.openxmlformats.org/drawingml/2006/main" xmlns:r="http://schemas.openxmlformats.org/officeDocument/2006/relationships" xmlns:p="http://schemas.openxmlformats.org/presentationml/2006/main">
+  <p:cSld>
+    <p:spTree>
+      <p:nvGrpSpPr>
         <p:cNvPr id="1" name="Shape 75"/>
         <p:cNvGrpSpPr/>
         <p:nvPr/>
@@ -10302,7 +10973,7 @@
 </p:sld>
 </file>
 
-<file path=ppt/slides/slide4.xml><?xml version="1.0" encoding="utf-8"?>
+<file path=ppt/slides/slide5.xml><?xml version="1.0" encoding="utf-8"?>
 <p:sld xmlns:a="http://schemas.openxmlformats.org/drawingml/2006/main" xmlns:r="http://schemas.openxmlformats.org/officeDocument/2006/relationships" xmlns:p="http://schemas.openxmlformats.org/presentationml/2006/main">
   <p:cSld>
     <p:spTree>
@@ -10623,7 +11294,7 @@
 </p:sld>
 </file>
 
-<file path=ppt/slides/slide5.xml><?xml version="1.0" encoding="utf-8"?>
+<file path=ppt/slides/slide6.xml><?xml version="1.0" encoding="utf-8"?>
 <p:sld xmlns:a="http://schemas.openxmlformats.org/drawingml/2006/main" xmlns:r="http://schemas.openxmlformats.org/officeDocument/2006/relationships" xmlns:p="http://schemas.openxmlformats.org/presentationml/2006/main">
   <p:cSld>
     <p:spTree>
@@ -10755,7 +11426,7 @@
 </p:sld>
 </file>
 
-<file path=ppt/slides/slide6.xml><?xml version="1.0" encoding="utf-8"?>
+<file path=ppt/slides/slide7.xml><?xml version="1.0" encoding="utf-8"?>
 <p:sld xmlns:a="http://schemas.openxmlformats.org/drawingml/2006/main" xmlns:r="http://schemas.openxmlformats.org/officeDocument/2006/relationships" xmlns:p="http://schemas.openxmlformats.org/presentationml/2006/main">
   <p:cSld>
     <p:spTree>
@@ -11018,7 +11689,7 @@
 </p:sld>
 </file>
 
-<file path=ppt/slides/slide7.xml><?xml version="1.0" encoding="utf-8"?>
+<file path=ppt/slides/slide8.xml><?xml version="1.0" encoding="utf-8"?>
 <p:sld xmlns:a="http://schemas.openxmlformats.org/drawingml/2006/main" xmlns:r="http://schemas.openxmlformats.org/officeDocument/2006/relationships" xmlns:p="http://schemas.openxmlformats.org/presentationml/2006/main">
   <p:cSld>
     <p:spTree>
@@ -11240,7 +11911,7 @@
 </p:sld>
 </file>
 
-<file path=ppt/slides/slide8.xml><?xml version="1.0" encoding="utf-8"?>
+<file path=ppt/slides/slide9.xml><?xml version="1.0" encoding="utf-8"?>
 <p:sld xmlns:a="http://schemas.openxmlformats.org/drawingml/2006/main" xmlns:r="http://schemas.openxmlformats.org/officeDocument/2006/relationships" xmlns:p="http://schemas.openxmlformats.org/presentationml/2006/main">
   <p:cSld>
     <p:spTree>
@@ -11413,348 +12084,6 @@
             <a:endParaRPr lang="en-NG" sz="1900" dirty="0">
               <a:latin typeface="PT Sans" panose="020B0503020203020204" pitchFamily="34" charset="77"/>
             </a:endParaRPr>
-          </a:p>
-        </p:txBody>
-      </p:sp>
-    </p:spTree>
-  </p:cSld>
-  <p:clrMapOvr>
-    <a:masterClrMapping/>
-  </p:clrMapOvr>
-</p:sld>
-</file>
-
-<file path=ppt/slides/slide9.xml><?xml version="1.0" encoding="utf-8"?>
-<p:sld xmlns:a="http://schemas.openxmlformats.org/drawingml/2006/main" xmlns:r="http://schemas.openxmlformats.org/officeDocument/2006/relationships" xmlns:p="http://schemas.openxmlformats.org/presentationml/2006/main">
-  <p:cSld>
-    <p:spTree>
-      <p:nvGrpSpPr>
-        <p:cNvPr id="1" name="Shape 117"/>
-        <p:cNvGrpSpPr/>
-        <p:nvPr/>
-      </p:nvGrpSpPr>
-      <p:grpSpPr>
-        <a:xfrm>
-          <a:off x="0" y="0"/>
-          <a:ext cx="0" cy="0"/>
-          <a:chOff x="0" y="0"/>
-          <a:chExt cx="0" cy="0"/>
-        </a:xfrm>
-      </p:grpSpPr>
-      <p:pic>
-        <p:nvPicPr>
-          <p:cNvPr id="119" name="Google Shape;119;p21"/>
-          <p:cNvPicPr preferRelativeResize="0"/>
-          <p:nvPr/>
-        </p:nvPicPr>
-        <p:blipFill>
-          <a:blip r:embed="rId3">
-            <a:alphaModFix/>
-          </a:blip>
-          <a:stretch>
-            <a:fillRect/>
-          </a:stretch>
-        </p:blipFill>
-        <p:spPr>
-          <a:xfrm>
-            <a:off x="6364585" y="260689"/>
-            <a:ext cx="2494874" cy="382110"/>
-          </a:xfrm>
-          <a:prstGeom prst="rect">
-            <a:avLst/>
-          </a:prstGeom>
-          <a:noFill/>
-          <a:ln>
-            <a:noFill/>
-          </a:ln>
-        </p:spPr>
-      </p:pic>
-      <p:pic>
-        <p:nvPicPr>
-          <p:cNvPr id="5" name="Picture 4" descr="Map&#10;&#10;Description automatically generated">
-            <a:extLst>
-              <a:ext uri="{FF2B5EF4-FFF2-40B4-BE49-F238E27FC236}">
-                <a16:creationId xmlns:a16="http://schemas.microsoft.com/office/drawing/2014/main" id="{145EC531-7E5A-8440-873B-3930BB652289}"/>
-              </a:ext>
-            </a:extLst>
-          </p:cNvPr>
-          <p:cNvPicPr>
-            <a:picLocks noChangeAspect="1"/>
-          </p:cNvPicPr>
-          <p:nvPr/>
-        </p:nvPicPr>
-        <p:blipFill>
-          <a:blip r:embed="rId4"/>
-          <a:stretch>
-            <a:fillRect/>
-          </a:stretch>
-        </p:blipFill>
-        <p:spPr>
-          <a:xfrm>
-            <a:off x="126752" y="917107"/>
-            <a:ext cx="3550429" cy="3012097"/>
-          </a:xfrm>
-          <a:prstGeom prst="rect">
-            <a:avLst/>
-          </a:prstGeom>
-        </p:spPr>
-      </p:pic>
-      <p:sp>
-        <p:nvSpPr>
-          <p:cNvPr id="6" name="TextBox 5">
-            <a:extLst>
-              <a:ext uri="{FF2B5EF4-FFF2-40B4-BE49-F238E27FC236}">
-                <a16:creationId xmlns:a16="http://schemas.microsoft.com/office/drawing/2014/main" id="{BDC49DCF-6AA9-254F-A9B6-14A1ED31BCD3}"/>
-              </a:ext>
-            </a:extLst>
-          </p:cNvPr>
-          <p:cNvSpPr txBox="1"/>
-          <p:nvPr/>
-        </p:nvSpPr>
-        <p:spPr>
-          <a:xfrm>
-            <a:off x="117692" y="3944501"/>
-            <a:ext cx="3935016" cy="292388"/>
-          </a:xfrm>
-          <a:prstGeom prst="rect">
-            <a:avLst/>
-          </a:prstGeom>
-          <a:noFill/>
-        </p:spPr>
-        <p:txBody>
-          <a:bodyPr wrap="square" rtlCol="0">
-            <a:spAutoFit/>
-          </a:bodyPr>
-          <a:lstStyle/>
-          <a:p>
-            <a:r>
-              <a:rPr lang="en-NG" sz="1300" dirty="0">
-                <a:latin typeface="PT Sans" panose="020B0503020203020204" pitchFamily="34" charset="77"/>
-              </a:rPr>
-              <a:t>Heatmap </a:t>
-            </a:r>
-            <a:r>
-              <a:rPr lang="en-NG" sz="1300">
-                <a:latin typeface="PT Sans" panose="020B0503020203020204" pitchFamily="34" charset="77"/>
-              </a:rPr>
-              <a:t>representing Hotspots </a:t>
-            </a:r>
-            <a:r>
-              <a:rPr lang="en-NG" sz="1300" dirty="0">
-                <a:latin typeface="PT Sans" panose="020B0503020203020204" pitchFamily="34" charset="77"/>
-              </a:rPr>
-              <a:t>of Crime in 2022</a:t>
-            </a:r>
-          </a:p>
-        </p:txBody>
-      </p:sp>
-      <p:pic>
-        <p:nvPicPr>
-          <p:cNvPr id="8" name="Picture 7" descr="Chart&#10;&#10;Description automatically generated with medium confidence">
-            <a:extLst>
-              <a:ext uri="{FF2B5EF4-FFF2-40B4-BE49-F238E27FC236}">
-                <a16:creationId xmlns:a16="http://schemas.microsoft.com/office/drawing/2014/main" id="{0FDE1E62-A3B2-5541-B652-CE103ECDEE88}"/>
-              </a:ext>
-            </a:extLst>
-          </p:cNvPr>
-          <p:cNvPicPr>
-            <a:picLocks noChangeAspect="1"/>
-          </p:cNvPicPr>
-          <p:nvPr/>
-        </p:nvPicPr>
-        <p:blipFill>
-          <a:blip r:embed="rId5"/>
-          <a:stretch>
-            <a:fillRect/>
-          </a:stretch>
-        </p:blipFill>
-        <p:spPr>
-          <a:xfrm>
-            <a:off x="3804540" y="917107"/>
-            <a:ext cx="2609313" cy="2622798"/>
-          </a:xfrm>
-          <a:prstGeom prst="rect">
-            <a:avLst/>
-          </a:prstGeom>
-        </p:spPr>
-      </p:pic>
-      <p:pic>
-        <p:nvPicPr>
-          <p:cNvPr id="10" name="Picture 9" descr="A picture containing chart&#10;&#10;Description automatically generated">
-            <a:extLst>
-              <a:ext uri="{FF2B5EF4-FFF2-40B4-BE49-F238E27FC236}">
-                <a16:creationId xmlns:a16="http://schemas.microsoft.com/office/drawing/2014/main" id="{AC484524-16A8-0349-8068-6F99609A4747}"/>
-              </a:ext>
-            </a:extLst>
-          </p:cNvPr>
-          <p:cNvPicPr>
-            <a:picLocks noChangeAspect="1"/>
-          </p:cNvPicPr>
-          <p:nvPr/>
-        </p:nvPicPr>
-        <p:blipFill>
-          <a:blip r:embed="rId6"/>
-          <a:stretch>
-            <a:fillRect/>
-          </a:stretch>
-        </p:blipFill>
-        <p:spPr>
-          <a:xfrm>
-            <a:off x="6481352" y="911211"/>
-            <a:ext cx="2631884" cy="3305647"/>
-          </a:xfrm>
-          <a:prstGeom prst="rect">
-            <a:avLst/>
-          </a:prstGeom>
-        </p:spPr>
-      </p:pic>
-      <p:cxnSp>
-        <p:nvCxnSpPr>
-          <p:cNvPr id="12" name="Straight Connector 11">
-            <a:extLst>
-              <a:ext uri="{FF2B5EF4-FFF2-40B4-BE49-F238E27FC236}">
-                <a16:creationId xmlns:a16="http://schemas.microsoft.com/office/drawing/2014/main" id="{E01A5F9B-A492-7847-8BE4-75028A5D6A2B}"/>
-              </a:ext>
-            </a:extLst>
-          </p:cNvPr>
-          <p:cNvCxnSpPr>
-            <a:cxnSpLocks/>
-          </p:cNvCxnSpPr>
-          <p:nvPr/>
-        </p:nvCxnSpPr>
-        <p:spPr>
-          <a:xfrm flipV="1">
-            <a:off x="3767618" y="760495"/>
-            <a:ext cx="32457" cy="3384000"/>
-          </a:xfrm>
-          <a:prstGeom prst="line">
-            <a:avLst/>
-          </a:prstGeom>
-        </p:spPr>
-        <p:style>
-          <a:lnRef idx="1">
-            <a:schemeClr val="accent1"/>
-          </a:lnRef>
-          <a:fillRef idx="0">
-            <a:schemeClr val="accent1"/>
-          </a:fillRef>
-          <a:effectRef idx="0">
-            <a:schemeClr val="accent1"/>
-          </a:effectRef>
-          <a:fontRef idx="minor">
-            <a:schemeClr val="tx1"/>
-          </a:fontRef>
-        </p:style>
-      </p:cxnSp>
-      <p:cxnSp>
-        <p:nvCxnSpPr>
-          <p:cNvPr id="20" name="Straight Connector 19">
-            <a:extLst>
-              <a:ext uri="{FF2B5EF4-FFF2-40B4-BE49-F238E27FC236}">
-                <a16:creationId xmlns:a16="http://schemas.microsoft.com/office/drawing/2014/main" id="{63A76207-6E13-D044-BDDA-16A82DC69076}"/>
-              </a:ext>
-            </a:extLst>
-          </p:cNvPr>
-          <p:cNvCxnSpPr>
-            <a:cxnSpLocks/>
-          </p:cNvCxnSpPr>
-          <p:nvPr/>
-        </p:nvCxnSpPr>
-        <p:spPr>
-          <a:xfrm flipV="1">
-            <a:off x="6458046" y="760494"/>
-            <a:ext cx="5200" cy="3384000"/>
-          </a:xfrm>
-          <a:prstGeom prst="line">
-            <a:avLst/>
-          </a:prstGeom>
-        </p:spPr>
-        <p:style>
-          <a:lnRef idx="1">
-            <a:schemeClr val="accent1"/>
-          </a:lnRef>
-          <a:fillRef idx="0">
-            <a:schemeClr val="accent1"/>
-          </a:fillRef>
-          <a:effectRef idx="0">
-            <a:schemeClr val="accent1"/>
-          </a:effectRef>
-          <a:fontRef idx="minor">
-            <a:schemeClr val="tx1"/>
-          </a:fontRef>
-        </p:style>
-      </p:cxnSp>
-      <p:sp>
-        <p:nvSpPr>
-          <p:cNvPr id="33" name="TextBox 32">
-            <a:extLst>
-              <a:ext uri="{FF2B5EF4-FFF2-40B4-BE49-F238E27FC236}">
-                <a16:creationId xmlns:a16="http://schemas.microsoft.com/office/drawing/2014/main" id="{7626A5DB-3046-EB49-A8D5-6919891CB165}"/>
-              </a:ext>
-            </a:extLst>
-          </p:cNvPr>
-          <p:cNvSpPr txBox="1"/>
-          <p:nvPr/>
-        </p:nvSpPr>
-        <p:spPr>
-          <a:xfrm>
-            <a:off x="3998390" y="3932185"/>
-            <a:ext cx="2107435" cy="292388"/>
-          </a:xfrm>
-          <a:prstGeom prst="rect">
-            <a:avLst/>
-          </a:prstGeom>
-          <a:noFill/>
-        </p:spPr>
-        <p:txBody>
-          <a:bodyPr wrap="square" rtlCol="0">
-            <a:spAutoFit/>
-          </a:bodyPr>
-          <a:lstStyle/>
-          <a:p>
-            <a:r>
-              <a:rPr lang="en-NG" sz="1300" dirty="0">
-                <a:latin typeface="PT Sans" panose="020B0503020203020204" pitchFamily="34" charset="77"/>
-              </a:rPr>
-              <a:t>Top Countries in crime rate</a:t>
-            </a:r>
-          </a:p>
-        </p:txBody>
-      </p:sp>
-      <p:sp>
-        <p:nvSpPr>
-          <p:cNvPr id="34" name="TextBox 33">
-            <a:extLst>
-              <a:ext uri="{FF2B5EF4-FFF2-40B4-BE49-F238E27FC236}">
-                <a16:creationId xmlns:a16="http://schemas.microsoft.com/office/drawing/2014/main" id="{80D79638-A515-4340-A198-6FC550E8E74C}"/>
-              </a:ext>
-            </a:extLst>
-          </p:cNvPr>
-          <p:cNvSpPr txBox="1"/>
-          <p:nvPr/>
-        </p:nvSpPr>
-        <p:spPr>
-          <a:xfrm>
-            <a:off x="6458046" y="3924470"/>
-            <a:ext cx="2437629" cy="292388"/>
-          </a:xfrm>
-          <a:prstGeom prst="rect">
-            <a:avLst/>
-          </a:prstGeom>
-          <a:noFill/>
-        </p:spPr>
-        <p:txBody>
-          <a:bodyPr wrap="square" rtlCol="0">
-            <a:spAutoFit/>
-          </a:bodyPr>
-          <a:lstStyle/>
-          <a:p>
-            <a:r>
-              <a:rPr lang="en-NG" sz="1300" dirty="0">
-                <a:latin typeface="PT Sans" panose="020B0503020203020204" pitchFamily="34" charset="77"/>
-              </a:rPr>
-              <a:t>Bottom Countries in crime rate</a:t>
-            </a:r>
           </a:p>
         </p:txBody>
       </p:sp>

</xml_diff>

<commit_message>
Made changes to outline and order of pages in slide.
</commit_message>
<xml_diff>
--- a/documentation/Theano Project Presentation Main.pptx
+++ b/documentation/Theano Project Presentation Main.pptx
@@ -10,8 +10,8 @@
   <p:sldIdLst>
     <p:sldId id="256" r:id="rId2"/>
     <p:sldId id="257" r:id="rId3"/>
-    <p:sldId id="278" r:id="rId4"/>
-    <p:sldId id="258" r:id="rId5"/>
+    <p:sldId id="258" r:id="rId4"/>
+    <p:sldId id="278" r:id="rId5"/>
     <p:sldId id="259" r:id="rId6"/>
     <p:sldId id="260" r:id="rId7"/>
     <p:sldId id="261" r:id="rId8"/>
@@ -1767,6 +1767,110 @@
   <p:cSld>
     <p:spTree>
       <p:nvGrpSpPr>
+        <p:cNvPr id="1" name="Shape 72"/>
+        <p:cNvGrpSpPr/>
+        <p:nvPr/>
+      </p:nvGrpSpPr>
+      <p:grpSpPr>
+        <a:xfrm>
+          <a:off x="0" y="0"/>
+          <a:ext cx="0" cy="0"/>
+          <a:chOff x="0" y="0"/>
+          <a:chExt cx="0" cy="0"/>
+        </a:xfrm>
+      </p:grpSpPr>
+      <p:sp>
+        <p:nvSpPr>
+          <p:cNvPr id="73" name="Google Shape;73;g238b681e494_0_69:notes"/>
+          <p:cNvSpPr>
+            <a:spLocks noGrp="1" noRot="1" noChangeAspect="1"/>
+          </p:cNvSpPr>
+          <p:nvPr>
+            <p:ph type="sldImg" idx="2"/>
+          </p:nvPr>
+        </p:nvSpPr>
+        <p:spPr>
+          <a:xfrm>
+            <a:off x="381000" y="685800"/>
+            <a:ext cx="6096000" cy="3429000"/>
+          </a:xfrm>
+          <a:custGeom>
+            <a:avLst/>
+            <a:gdLst/>
+            <a:ahLst/>
+            <a:cxnLst/>
+            <a:rect l="l" t="t" r="r" b="b"/>
+            <a:pathLst>
+              <a:path w="120000" h="120000" extrusionOk="0">
+                <a:moveTo>
+                  <a:pt x="0" y="0"/>
+                </a:moveTo>
+                <a:lnTo>
+                  <a:pt x="120000" y="0"/>
+                </a:lnTo>
+                <a:lnTo>
+                  <a:pt x="120000" y="120000"/>
+                </a:lnTo>
+                <a:lnTo>
+                  <a:pt x="0" y="120000"/>
+                </a:lnTo>
+                <a:close/>
+              </a:path>
+            </a:pathLst>
+          </a:custGeom>
+        </p:spPr>
+      </p:sp>
+      <p:sp>
+        <p:nvSpPr>
+          <p:cNvPr id="74" name="Google Shape;74;g238b681e494_0_69:notes"/>
+          <p:cNvSpPr txBox="1">
+            <a:spLocks noGrp="1"/>
+          </p:cNvSpPr>
+          <p:nvPr>
+            <p:ph type="body" idx="1"/>
+          </p:nvPr>
+        </p:nvSpPr>
+        <p:spPr>
+          <a:xfrm>
+            <a:off x="685800" y="4343400"/>
+            <a:ext cx="5486400" cy="4114800"/>
+          </a:xfrm>
+          <a:prstGeom prst="rect">
+            <a:avLst/>
+          </a:prstGeom>
+        </p:spPr>
+        <p:txBody>
+          <a:bodyPr spcFirstLastPara="1" wrap="square" lIns="91425" tIns="91425" rIns="91425" bIns="91425" anchor="t" anchorCtr="0">
+            <a:noAutofit/>
+          </a:bodyPr>
+          <a:lstStyle/>
+          <a:p>
+            <a:pPr marL="0" lvl="0" indent="0" algn="l" rtl="0">
+              <a:spcBef>
+                <a:spcPts val="0"/>
+              </a:spcBef>
+              <a:spcAft>
+                <a:spcPts val="0"/>
+              </a:spcAft>
+              <a:buNone/>
+            </a:pPr>
+            <a:endParaRPr/>
+          </a:p>
+        </p:txBody>
+      </p:sp>
+    </p:spTree>
+  </p:cSld>
+  <p:clrMapOvr>
+    <a:masterClrMapping/>
+  </p:clrMapOvr>
+</p:notes>
+</file>
+
+<file path=ppt/notesSlides/notesSlide4.xml><?xml version="1.0" encoding="utf-8"?>
+<p:notes xmlns:a="http://schemas.openxmlformats.org/drawingml/2006/main" xmlns:r="http://schemas.openxmlformats.org/officeDocument/2006/relationships" xmlns:p="http://schemas.openxmlformats.org/presentationml/2006/main" showMasterSp="0" showMasterPhAnim="0">
+  <p:cSld>
+    <p:spTree>
+      <p:nvGrpSpPr>
         <p:cNvPr id="1" name="Shape 59"/>
         <p:cNvGrpSpPr/>
         <p:nvPr/>
@@ -1864,110 +1968,6 @@
         <p14:creationId xmlns:p14="http://schemas.microsoft.com/office/powerpoint/2010/main" val="989675563"/>
       </p:ext>
     </p:extLst>
-  </p:cSld>
-  <p:clrMapOvr>
-    <a:masterClrMapping/>
-  </p:clrMapOvr>
-</p:notes>
-</file>
-
-<file path=ppt/notesSlides/notesSlide4.xml><?xml version="1.0" encoding="utf-8"?>
-<p:notes xmlns:a="http://schemas.openxmlformats.org/drawingml/2006/main" xmlns:r="http://schemas.openxmlformats.org/officeDocument/2006/relationships" xmlns:p="http://schemas.openxmlformats.org/presentationml/2006/main" showMasterSp="0" showMasterPhAnim="0">
-  <p:cSld>
-    <p:spTree>
-      <p:nvGrpSpPr>
-        <p:cNvPr id="1" name="Shape 72"/>
-        <p:cNvGrpSpPr/>
-        <p:nvPr/>
-      </p:nvGrpSpPr>
-      <p:grpSpPr>
-        <a:xfrm>
-          <a:off x="0" y="0"/>
-          <a:ext cx="0" cy="0"/>
-          <a:chOff x="0" y="0"/>
-          <a:chExt cx="0" cy="0"/>
-        </a:xfrm>
-      </p:grpSpPr>
-      <p:sp>
-        <p:nvSpPr>
-          <p:cNvPr id="73" name="Google Shape;73;g238b681e494_0_69:notes"/>
-          <p:cNvSpPr>
-            <a:spLocks noGrp="1" noRot="1" noChangeAspect="1"/>
-          </p:cNvSpPr>
-          <p:nvPr>
-            <p:ph type="sldImg" idx="2"/>
-          </p:nvPr>
-        </p:nvSpPr>
-        <p:spPr>
-          <a:xfrm>
-            <a:off x="381000" y="685800"/>
-            <a:ext cx="6096000" cy="3429000"/>
-          </a:xfrm>
-          <a:custGeom>
-            <a:avLst/>
-            <a:gdLst/>
-            <a:ahLst/>
-            <a:cxnLst/>
-            <a:rect l="l" t="t" r="r" b="b"/>
-            <a:pathLst>
-              <a:path w="120000" h="120000" extrusionOk="0">
-                <a:moveTo>
-                  <a:pt x="0" y="0"/>
-                </a:moveTo>
-                <a:lnTo>
-                  <a:pt x="120000" y="0"/>
-                </a:lnTo>
-                <a:lnTo>
-                  <a:pt x="120000" y="120000"/>
-                </a:lnTo>
-                <a:lnTo>
-                  <a:pt x="0" y="120000"/>
-                </a:lnTo>
-                <a:close/>
-              </a:path>
-            </a:pathLst>
-          </a:custGeom>
-        </p:spPr>
-      </p:sp>
-      <p:sp>
-        <p:nvSpPr>
-          <p:cNvPr id="74" name="Google Shape;74;g238b681e494_0_69:notes"/>
-          <p:cNvSpPr txBox="1">
-            <a:spLocks noGrp="1"/>
-          </p:cNvSpPr>
-          <p:nvPr>
-            <p:ph type="body" idx="1"/>
-          </p:nvPr>
-        </p:nvSpPr>
-        <p:spPr>
-          <a:xfrm>
-            <a:off x="685800" y="4343400"/>
-            <a:ext cx="5486400" cy="4114800"/>
-          </a:xfrm>
-          <a:prstGeom prst="rect">
-            <a:avLst/>
-          </a:prstGeom>
-        </p:spPr>
-        <p:txBody>
-          <a:bodyPr spcFirstLastPara="1" wrap="square" lIns="91425" tIns="91425" rIns="91425" bIns="91425" anchor="t" anchorCtr="0">
-            <a:noAutofit/>
-          </a:bodyPr>
-          <a:lstStyle/>
-          <a:p>
-            <a:pPr marL="0" lvl="0" indent="0" algn="l" rtl="0">
-              <a:spcBef>
-                <a:spcPts val="0"/>
-              </a:spcBef>
-              <a:spcAft>
-                <a:spcPts val="0"/>
-              </a:spcAft>
-              <a:buNone/>
-            </a:pPr>
-            <a:endParaRPr/>
-          </a:p>
-        </p:txBody>
-      </p:sp>
-    </p:spTree>
   </p:cSld>
   <p:clrMapOvr>
     <a:masterClrMapping/>
@@ -10111,6 +10111,703 @@
   <p:cSld>
     <p:spTree>
       <p:nvGrpSpPr>
+        <p:cNvPr id="1" name="Shape 75"/>
+        <p:cNvGrpSpPr/>
+        <p:nvPr/>
+      </p:nvGrpSpPr>
+      <p:grpSpPr>
+        <a:xfrm>
+          <a:off x="0" y="0"/>
+          <a:ext cx="0" cy="0"/>
+          <a:chOff x="0" y="0"/>
+          <a:chExt cx="0" cy="0"/>
+        </a:xfrm>
+      </p:grpSpPr>
+      <p:pic>
+        <p:nvPicPr>
+          <p:cNvPr id="77" name="Google Shape;77;p15"/>
+          <p:cNvPicPr preferRelativeResize="0"/>
+          <p:nvPr/>
+        </p:nvPicPr>
+        <p:blipFill>
+          <a:blip r:embed="rId3">
+            <a:alphaModFix/>
+          </a:blip>
+          <a:stretch>
+            <a:fillRect/>
+          </a:stretch>
+        </p:blipFill>
+        <p:spPr>
+          <a:xfrm>
+            <a:off x="6346480" y="184416"/>
+            <a:ext cx="2594462" cy="427704"/>
+          </a:xfrm>
+          <a:prstGeom prst="rect">
+            <a:avLst/>
+          </a:prstGeom>
+          <a:noFill/>
+          <a:ln>
+            <a:noFill/>
+          </a:ln>
+        </p:spPr>
+      </p:pic>
+      <p:sp>
+        <p:nvSpPr>
+          <p:cNvPr id="78" name="Google Shape;78;p15"/>
+          <p:cNvSpPr txBox="1">
+            <a:spLocks noGrp="1"/>
+          </p:cNvSpPr>
+          <p:nvPr>
+            <p:ph type="body" idx="4294967295"/>
+          </p:nvPr>
+        </p:nvSpPr>
+        <p:spPr>
+          <a:xfrm>
+            <a:off x="416459" y="1212165"/>
+            <a:ext cx="4680642" cy="2812326"/>
+          </a:xfrm>
+          <a:prstGeom prst="rect">
+            <a:avLst/>
+          </a:prstGeom>
+          <a:noFill/>
+          <a:ln>
+            <a:noFill/>
+          </a:ln>
+        </p:spPr>
+        <p:txBody>
+          <a:bodyPr spcFirstLastPara="1" wrap="square" lIns="0" tIns="91425" rIns="0" bIns="91425" anchor="t" anchorCtr="0">
+            <a:noAutofit/>
+          </a:bodyPr>
+          <a:lstStyle/>
+          <a:p>
+            <a:pPr marL="342900" marR="0" lvl="0" algn="l" rtl="0">
+              <a:lnSpc>
+                <a:spcPct val="115000"/>
+              </a:lnSpc>
+              <a:spcBef>
+                <a:spcPts val="1200"/>
+              </a:spcBef>
+              <a:spcAft>
+                <a:spcPts val="0"/>
+              </a:spcAft>
+              <a:buClr>
+                <a:schemeClr val="tx1"/>
+              </a:buClr>
+              <a:buSzPct val="100000"/>
+              <a:buFont typeface="Arial"/>
+              <a:buAutoNum type="arabicPeriod"/>
+            </a:pPr>
+            <a:r>
+              <a:rPr lang="en-GB" sz="2500" u="none" strike="noStrike" cap="none" dirty="0">
+                <a:solidFill>
+                  <a:schemeClr val="tx1"/>
+                </a:solidFill>
+                <a:latin typeface="PT Sans" panose="020B0503020203020204" pitchFamily="34" charset="77"/>
+                <a:cs typeface="Times New Roman" panose="02020603050405020304" pitchFamily="18" charset="0"/>
+                <a:sym typeface="Arial"/>
+              </a:rPr>
+              <a:t>Introduction</a:t>
+            </a:r>
+          </a:p>
+          <a:p>
+            <a:pPr marL="342900" marR="0" lvl="0" algn="l" rtl="0">
+              <a:lnSpc>
+                <a:spcPct val="115000"/>
+              </a:lnSpc>
+              <a:spcBef>
+                <a:spcPts val="1200"/>
+              </a:spcBef>
+              <a:spcAft>
+                <a:spcPts val="0"/>
+              </a:spcAft>
+              <a:buClr>
+                <a:schemeClr val="tx1"/>
+              </a:buClr>
+              <a:buSzPct val="100000"/>
+              <a:buFont typeface="Arial"/>
+              <a:buAutoNum type="arabicPeriod"/>
+            </a:pPr>
+            <a:r>
+              <a:rPr lang="en-GB" sz="2500" u="none" strike="noStrike" cap="none" dirty="0">
+                <a:solidFill>
+                  <a:schemeClr val="tx1"/>
+                </a:solidFill>
+                <a:latin typeface="PT Sans" panose="020B0503020203020204" pitchFamily="34" charset="77"/>
+                <a:cs typeface="Times New Roman" panose="02020603050405020304" pitchFamily="18" charset="0"/>
+                <a:sym typeface="Arial"/>
+              </a:rPr>
+              <a:t>Problem Statement</a:t>
+            </a:r>
+          </a:p>
+          <a:p>
+            <a:pPr marL="342900" marR="0" lvl="0" algn="l" rtl="0">
+              <a:lnSpc>
+                <a:spcPct val="115000"/>
+              </a:lnSpc>
+              <a:spcBef>
+                <a:spcPts val="1200"/>
+              </a:spcBef>
+              <a:spcAft>
+                <a:spcPts val="0"/>
+              </a:spcAft>
+              <a:buClr>
+                <a:schemeClr val="tx1"/>
+              </a:buClr>
+              <a:buSzPct val="100000"/>
+              <a:buFont typeface="Arial"/>
+              <a:buAutoNum type="arabicPeriod"/>
+            </a:pPr>
+            <a:r>
+              <a:rPr lang="en-GB" sz="2500" dirty="0">
+                <a:solidFill>
+                  <a:schemeClr val="tx1"/>
+                </a:solidFill>
+                <a:latin typeface="PT Sans" panose="020B0503020203020204" pitchFamily="34" charset="77"/>
+                <a:cs typeface="Times New Roman" panose="02020603050405020304" pitchFamily="18" charset="0"/>
+              </a:rPr>
+              <a:t>Process Flow</a:t>
+            </a:r>
+          </a:p>
+          <a:p>
+            <a:pPr marL="342900" marR="0" lvl="0" algn="l" rtl="0">
+              <a:lnSpc>
+                <a:spcPct val="115000"/>
+              </a:lnSpc>
+              <a:spcBef>
+                <a:spcPts val="1200"/>
+              </a:spcBef>
+              <a:spcAft>
+                <a:spcPts val="0"/>
+              </a:spcAft>
+              <a:buClr>
+                <a:schemeClr val="tx1"/>
+              </a:buClr>
+              <a:buSzPct val="100000"/>
+              <a:buFont typeface="Arial"/>
+              <a:buAutoNum type="arabicPeriod"/>
+            </a:pPr>
+            <a:r>
+              <a:rPr lang="en-GB" sz="2500" u="none" strike="noStrike" cap="none" dirty="0">
+                <a:solidFill>
+                  <a:schemeClr val="tx1"/>
+                </a:solidFill>
+                <a:latin typeface="PT Sans" panose="020B0503020203020204" pitchFamily="34" charset="77"/>
+                <a:cs typeface="Times New Roman" panose="02020603050405020304" pitchFamily="18" charset="0"/>
+                <a:sym typeface="Arial"/>
+              </a:rPr>
+              <a:t>Exploratory Data Analysis</a:t>
+            </a:r>
+          </a:p>
+          <a:p>
+            <a:pPr marL="342900" marR="0" lvl="0" algn="l" rtl="0">
+              <a:lnSpc>
+                <a:spcPct val="115000"/>
+              </a:lnSpc>
+              <a:spcBef>
+                <a:spcPts val="1200"/>
+              </a:spcBef>
+              <a:spcAft>
+                <a:spcPts val="0"/>
+              </a:spcAft>
+              <a:buClr>
+                <a:schemeClr val="tx1"/>
+              </a:buClr>
+              <a:buSzPct val="100000"/>
+              <a:buFont typeface="Arial"/>
+              <a:buAutoNum type="arabicPeriod"/>
+            </a:pPr>
+            <a:r>
+              <a:rPr lang="en-GB" sz="2500" dirty="0">
+                <a:solidFill>
+                  <a:schemeClr val="tx1"/>
+                </a:solidFill>
+                <a:latin typeface="PT Sans" panose="020B0503020203020204" pitchFamily="34" charset="77"/>
+                <a:cs typeface="Times New Roman" panose="02020603050405020304" pitchFamily="18" charset="0"/>
+              </a:rPr>
+              <a:t>Feature selection and engineering</a:t>
+            </a:r>
+            <a:endParaRPr sz="2500" u="none" strike="noStrike" cap="none" dirty="0">
+              <a:solidFill>
+                <a:schemeClr val="tx1"/>
+              </a:solidFill>
+              <a:latin typeface="PT Sans" panose="020B0503020203020204" pitchFamily="34" charset="77"/>
+              <a:cs typeface="Times New Roman" panose="02020603050405020304" pitchFamily="18" charset="0"/>
+              <a:sym typeface="Arial"/>
+            </a:endParaRPr>
+          </a:p>
+          <a:p>
+            <a:pPr marL="0" marR="0" lvl="0" indent="0" algn="l" rtl="0">
+              <a:lnSpc>
+                <a:spcPct val="115000"/>
+              </a:lnSpc>
+              <a:spcBef>
+                <a:spcPts val="1199"/>
+              </a:spcBef>
+              <a:spcAft>
+                <a:spcPts val="0"/>
+              </a:spcAft>
+              <a:buClr>
+                <a:schemeClr val="tx1"/>
+              </a:buClr>
+              <a:buSzPct val="100000"/>
+              <a:buFont typeface="Arial"/>
+              <a:buNone/>
+            </a:pPr>
+            <a:endParaRPr sz="2500" u="none" strike="noStrike" cap="none" dirty="0">
+              <a:solidFill>
+                <a:schemeClr val="tx1"/>
+              </a:solidFill>
+              <a:latin typeface="PT Sans" panose="020B0503020203020204" pitchFamily="34" charset="77"/>
+              <a:cs typeface="Times New Roman" panose="02020603050405020304" pitchFamily="18" charset="0"/>
+              <a:sym typeface="Arial"/>
+            </a:endParaRPr>
+          </a:p>
+        </p:txBody>
+      </p:sp>
+      <p:sp>
+        <p:nvSpPr>
+          <p:cNvPr id="7" name="Google Shape;67;p14">
+            <a:extLst>
+              <a:ext uri="{FF2B5EF4-FFF2-40B4-BE49-F238E27FC236}">
+                <a16:creationId xmlns:a16="http://schemas.microsoft.com/office/drawing/2014/main" id="{85D3EB7A-9511-F049-9180-188515890CC0}"/>
+              </a:ext>
+            </a:extLst>
+          </p:cNvPr>
+          <p:cNvSpPr txBox="1">
+            <a:spLocks noGrp="1"/>
+          </p:cNvSpPr>
+          <p:nvPr>
+            <p:ph type="subTitle" idx="1"/>
+          </p:nvPr>
+        </p:nvSpPr>
+        <p:spPr>
+          <a:xfrm>
+            <a:off x="416459" y="764565"/>
+            <a:ext cx="5353678" cy="447600"/>
+          </a:xfrm>
+          <a:prstGeom prst="rect">
+            <a:avLst/>
+          </a:prstGeom>
+        </p:spPr>
+        <p:txBody>
+          <a:bodyPr spcFirstLastPara="1" wrap="square" lIns="91425" tIns="91425" rIns="91425" bIns="91425" anchor="t" anchorCtr="0">
+            <a:noAutofit/>
+          </a:bodyPr>
+          <a:lstStyle/>
+          <a:p>
+            <a:pPr marL="0" lvl="0" indent="0" algn="l" rtl="0">
+              <a:lnSpc>
+                <a:spcPct val="80000"/>
+              </a:lnSpc>
+              <a:spcBef>
+                <a:spcPts val="0"/>
+              </a:spcBef>
+              <a:spcAft>
+                <a:spcPts val="0"/>
+              </a:spcAft>
+              <a:buNone/>
+            </a:pPr>
+            <a:r>
+              <a:rPr lang="en" sz="3200" b="1" dirty="0">
+                <a:solidFill>
+                  <a:schemeClr val="tx1"/>
+                </a:solidFill>
+                <a:latin typeface="PT Sans" panose="020B0503020203020204" pitchFamily="34" charset="77"/>
+                <a:cs typeface="Times New Roman" panose="02020603050405020304" pitchFamily="18" charset="0"/>
+              </a:rPr>
+              <a:t>Presentation Outline</a:t>
+            </a:r>
+            <a:endParaRPr sz="3200" b="1" dirty="0">
+              <a:solidFill>
+                <a:schemeClr val="tx1"/>
+              </a:solidFill>
+              <a:latin typeface="PT Sans" panose="020B0503020203020204" pitchFamily="34" charset="77"/>
+              <a:cs typeface="Times New Roman" panose="02020603050405020304" pitchFamily="18" charset="0"/>
+            </a:endParaRPr>
+          </a:p>
+        </p:txBody>
+      </p:sp>
+      <p:sp>
+        <p:nvSpPr>
+          <p:cNvPr id="8" name="Google Shape;78;p15">
+            <a:extLst>
+              <a:ext uri="{FF2B5EF4-FFF2-40B4-BE49-F238E27FC236}">
+                <a16:creationId xmlns:a16="http://schemas.microsoft.com/office/drawing/2014/main" id="{93577895-6796-794E-ADC2-2948F0A69EB2}"/>
+              </a:ext>
+            </a:extLst>
+          </p:cNvPr>
+          <p:cNvSpPr txBox="1">
+            <a:spLocks/>
+          </p:cNvSpPr>
+          <p:nvPr/>
+        </p:nvSpPr>
+        <p:spPr>
+          <a:xfrm>
+            <a:off x="5097101" y="1212165"/>
+            <a:ext cx="3938259" cy="3401888"/>
+          </a:xfrm>
+          <a:prstGeom prst="rect">
+            <a:avLst/>
+          </a:prstGeom>
+          <a:noFill/>
+          <a:ln>
+            <a:noFill/>
+          </a:ln>
+        </p:spPr>
+        <p:txBody>
+          <a:bodyPr spcFirstLastPara="1" wrap="square" lIns="0" tIns="91425" rIns="0" bIns="91425" anchor="t" anchorCtr="0">
+            <a:noAutofit/>
+          </a:bodyPr>
+          <a:lstStyle>
+            <a:defPPr marR="0" lvl="0" algn="l" rtl="0">
+              <a:lnSpc>
+                <a:spcPct val="100000"/>
+              </a:lnSpc>
+              <a:spcBef>
+                <a:spcPts val="0"/>
+              </a:spcBef>
+              <a:spcAft>
+                <a:spcPts val="0"/>
+              </a:spcAft>
+            </a:defPPr>
+            <a:lvl1pPr marL="457200" marR="0" lvl="0" indent="-342900" algn="l" rtl="0">
+              <a:lnSpc>
+                <a:spcPct val="115000"/>
+              </a:lnSpc>
+              <a:spcBef>
+                <a:spcPts val="0"/>
+              </a:spcBef>
+              <a:spcAft>
+                <a:spcPts val="0"/>
+              </a:spcAft>
+              <a:buClr>
+                <a:schemeClr val="dk2"/>
+              </a:buClr>
+              <a:buSzPts val="1800"/>
+              <a:buFont typeface="Arial"/>
+              <a:buChar char="●"/>
+              <a:defRPr sz="1800" b="0" i="0" u="none" strike="noStrike" cap="none">
+                <a:solidFill>
+                  <a:schemeClr val="dk2"/>
+                </a:solidFill>
+                <a:latin typeface="Arial"/>
+                <a:ea typeface="Arial"/>
+                <a:cs typeface="Arial"/>
+                <a:sym typeface="Arial"/>
+              </a:defRPr>
+            </a:lvl1pPr>
+            <a:lvl2pPr marL="914400" marR="0" lvl="1" indent="-317500" algn="l" rtl="0">
+              <a:lnSpc>
+                <a:spcPct val="115000"/>
+              </a:lnSpc>
+              <a:spcBef>
+                <a:spcPts val="0"/>
+              </a:spcBef>
+              <a:spcAft>
+                <a:spcPts val="0"/>
+              </a:spcAft>
+              <a:buClr>
+                <a:schemeClr val="dk2"/>
+              </a:buClr>
+              <a:buSzPts val="1400"/>
+              <a:buFont typeface="Arial"/>
+              <a:buChar char="○"/>
+              <a:defRPr sz="1400" b="0" i="0" u="none" strike="noStrike" cap="none">
+                <a:solidFill>
+                  <a:schemeClr val="dk2"/>
+                </a:solidFill>
+                <a:latin typeface="Arial"/>
+                <a:ea typeface="Arial"/>
+                <a:cs typeface="Arial"/>
+                <a:sym typeface="Arial"/>
+              </a:defRPr>
+            </a:lvl2pPr>
+            <a:lvl3pPr marL="1371600" marR="0" lvl="2" indent="-317500" algn="l" rtl="0">
+              <a:lnSpc>
+                <a:spcPct val="115000"/>
+              </a:lnSpc>
+              <a:spcBef>
+                <a:spcPts val="0"/>
+              </a:spcBef>
+              <a:spcAft>
+                <a:spcPts val="0"/>
+              </a:spcAft>
+              <a:buClr>
+                <a:schemeClr val="dk2"/>
+              </a:buClr>
+              <a:buSzPts val="1400"/>
+              <a:buFont typeface="Arial"/>
+              <a:buChar char="■"/>
+              <a:defRPr sz="1400" b="0" i="0" u="none" strike="noStrike" cap="none">
+                <a:solidFill>
+                  <a:schemeClr val="dk2"/>
+                </a:solidFill>
+                <a:latin typeface="Arial"/>
+                <a:ea typeface="Arial"/>
+                <a:cs typeface="Arial"/>
+                <a:sym typeface="Arial"/>
+              </a:defRPr>
+            </a:lvl3pPr>
+            <a:lvl4pPr marL="1828800" marR="0" lvl="3" indent="-317500" algn="l" rtl="0">
+              <a:lnSpc>
+                <a:spcPct val="115000"/>
+              </a:lnSpc>
+              <a:spcBef>
+                <a:spcPts val="0"/>
+              </a:spcBef>
+              <a:spcAft>
+                <a:spcPts val="0"/>
+              </a:spcAft>
+              <a:buClr>
+                <a:schemeClr val="dk2"/>
+              </a:buClr>
+              <a:buSzPts val="1400"/>
+              <a:buFont typeface="Arial"/>
+              <a:buChar char="●"/>
+              <a:defRPr sz="1400" b="0" i="0" u="none" strike="noStrike" cap="none">
+                <a:solidFill>
+                  <a:schemeClr val="dk2"/>
+                </a:solidFill>
+                <a:latin typeface="Arial"/>
+                <a:ea typeface="Arial"/>
+                <a:cs typeface="Arial"/>
+                <a:sym typeface="Arial"/>
+              </a:defRPr>
+            </a:lvl4pPr>
+            <a:lvl5pPr marL="2286000" marR="0" lvl="4" indent="-317500" algn="l" rtl="0">
+              <a:lnSpc>
+                <a:spcPct val="115000"/>
+              </a:lnSpc>
+              <a:spcBef>
+                <a:spcPts val="0"/>
+              </a:spcBef>
+              <a:spcAft>
+                <a:spcPts val="0"/>
+              </a:spcAft>
+              <a:buClr>
+                <a:schemeClr val="dk2"/>
+              </a:buClr>
+              <a:buSzPts val="1400"/>
+              <a:buFont typeface="Arial"/>
+              <a:buChar char="○"/>
+              <a:defRPr sz="1400" b="0" i="0" u="none" strike="noStrike" cap="none">
+                <a:solidFill>
+                  <a:schemeClr val="dk2"/>
+                </a:solidFill>
+                <a:latin typeface="Arial"/>
+                <a:ea typeface="Arial"/>
+                <a:cs typeface="Arial"/>
+                <a:sym typeface="Arial"/>
+              </a:defRPr>
+            </a:lvl5pPr>
+            <a:lvl6pPr marL="2743200" marR="0" lvl="5" indent="-317500" algn="l" rtl="0">
+              <a:lnSpc>
+                <a:spcPct val="115000"/>
+              </a:lnSpc>
+              <a:spcBef>
+                <a:spcPts val="0"/>
+              </a:spcBef>
+              <a:spcAft>
+                <a:spcPts val="0"/>
+              </a:spcAft>
+              <a:buClr>
+                <a:schemeClr val="dk2"/>
+              </a:buClr>
+              <a:buSzPts val="1400"/>
+              <a:buFont typeface="Arial"/>
+              <a:buChar char="■"/>
+              <a:defRPr sz="1400" b="0" i="0" u="none" strike="noStrike" cap="none">
+                <a:solidFill>
+                  <a:schemeClr val="dk2"/>
+                </a:solidFill>
+                <a:latin typeface="Arial"/>
+                <a:ea typeface="Arial"/>
+                <a:cs typeface="Arial"/>
+                <a:sym typeface="Arial"/>
+              </a:defRPr>
+            </a:lvl6pPr>
+            <a:lvl7pPr marL="3200400" marR="0" lvl="6" indent="-317500" algn="l" rtl="0">
+              <a:lnSpc>
+                <a:spcPct val="115000"/>
+              </a:lnSpc>
+              <a:spcBef>
+                <a:spcPts val="0"/>
+              </a:spcBef>
+              <a:spcAft>
+                <a:spcPts val="0"/>
+              </a:spcAft>
+              <a:buClr>
+                <a:schemeClr val="dk2"/>
+              </a:buClr>
+              <a:buSzPts val="1400"/>
+              <a:buFont typeface="Arial"/>
+              <a:buChar char="●"/>
+              <a:defRPr sz="1400" b="0" i="0" u="none" strike="noStrike" cap="none">
+                <a:solidFill>
+                  <a:schemeClr val="dk2"/>
+                </a:solidFill>
+                <a:latin typeface="Arial"/>
+                <a:ea typeface="Arial"/>
+                <a:cs typeface="Arial"/>
+                <a:sym typeface="Arial"/>
+              </a:defRPr>
+            </a:lvl7pPr>
+            <a:lvl8pPr marL="3657600" marR="0" lvl="7" indent="-317500" algn="l" rtl="0">
+              <a:lnSpc>
+                <a:spcPct val="115000"/>
+              </a:lnSpc>
+              <a:spcBef>
+                <a:spcPts val="0"/>
+              </a:spcBef>
+              <a:spcAft>
+                <a:spcPts val="0"/>
+              </a:spcAft>
+              <a:buClr>
+                <a:schemeClr val="dk2"/>
+              </a:buClr>
+              <a:buSzPts val="1400"/>
+              <a:buFont typeface="Arial"/>
+              <a:buChar char="○"/>
+              <a:defRPr sz="1400" b="0" i="0" u="none" strike="noStrike" cap="none">
+                <a:solidFill>
+                  <a:schemeClr val="dk2"/>
+                </a:solidFill>
+                <a:latin typeface="Arial"/>
+                <a:ea typeface="Arial"/>
+                <a:cs typeface="Arial"/>
+                <a:sym typeface="Arial"/>
+              </a:defRPr>
+            </a:lvl8pPr>
+            <a:lvl9pPr marL="4114800" marR="0" lvl="8" indent="-317500" algn="l" rtl="0">
+              <a:lnSpc>
+                <a:spcPct val="115000"/>
+              </a:lnSpc>
+              <a:spcBef>
+                <a:spcPts val="0"/>
+              </a:spcBef>
+              <a:spcAft>
+                <a:spcPts val="0"/>
+              </a:spcAft>
+              <a:buClr>
+                <a:schemeClr val="dk2"/>
+              </a:buClr>
+              <a:buSzPts val="1400"/>
+              <a:buFont typeface="Arial"/>
+              <a:buChar char="■"/>
+              <a:defRPr sz="1400" b="0" i="0" u="none" strike="noStrike" cap="none">
+                <a:solidFill>
+                  <a:schemeClr val="dk2"/>
+                </a:solidFill>
+                <a:latin typeface="Arial"/>
+                <a:ea typeface="Arial"/>
+                <a:cs typeface="Arial"/>
+                <a:sym typeface="Arial"/>
+              </a:defRPr>
+            </a:lvl9pPr>
+          </a:lstStyle>
+          <a:p>
+            <a:pPr indent="-457200">
+              <a:spcBef>
+                <a:spcPts val="1200"/>
+              </a:spcBef>
+              <a:buClr>
+                <a:schemeClr val="tx1"/>
+              </a:buClr>
+              <a:buSzPct val="100000"/>
+              <a:buFont typeface="+mj-lt"/>
+              <a:buAutoNum type="arabicPeriod" startAt="6"/>
+            </a:pPr>
+            <a:r>
+              <a:rPr lang="en-GB" sz="2500" dirty="0">
+                <a:solidFill>
+                  <a:schemeClr val="tx1"/>
+                </a:solidFill>
+                <a:latin typeface="PT Sans" panose="020B0503020203020204" pitchFamily="34" charset="77"/>
+                <a:cs typeface="Times New Roman" panose="02020603050405020304" pitchFamily="18" charset="0"/>
+              </a:rPr>
+              <a:t>Model Training and Evaluation</a:t>
+            </a:r>
+          </a:p>
+          <a:p>
+            <a:pPr indent="-457200">
+              <a:spcBef>
+                <a:spcPts val="1200"/>
+              </a:spcBef>
+              <a:buClr>
+                <a:schemeClr val="tx1"/>
+              </a:buClr>
+              <a:buSzPct val="100000"/>
+              <a:buFont typeface="+mj-lt"/>
+              <a:buAutoNum type="arabicPeriod" startAt="6"/>
+            </a:pPr>
+            <a:r>
+              <a:rPr lang="en-GB" sz="2500" dirty="0">
+                <a:solidFill>
+                  <a:schemeClr val="tx1"/>
+                </a:solidFill>
+                <a:latin typeface="PT Sans" panose="020B0503020203020204" pitchFamily="34" charset="77"/>
+                <a:cs typeface="Times New Roman" panose="02020603050405020304" pitchFamily="18" charset="0"/>
+              </a:rPr>
+              <a:t>Summary of Solution</a:t>
+            </a:r>
+          </a:p>
+          <a:p>
+            <a:pPr indent="-457200">
+              <a:spcBef>
+                <a:spcPts val="1200"/>
+              </a:spcBef>
+              <a:buClr>
+                <a:schemeClr val="tx1"/>
+              </a:buClr>
+              <a:buSzPct val="100000"/>
+              <a:buFont typeface="+mj-lt"/>
+              <a:buAutoNum type="arabicPeriod" startAt="6"/>
+            </a:pPr>
+            <a:r>
+              <a:rPr lang="en-GB" sz="2500" dirty="0">
+                <a:solidFill>
+                  <a:schemeClr val="tx1"/>
+                </a:solidFill>
+                <a:latin typeface="PT Sans" panose="020B0503020203020204" pitchFamily="34" charset="77"/>
+                <a:cs typeface="Times New Roman" panose="02020603050405020304" pitchFamily="18" charset="0"/>
+              </a:rPr>
+              <a:t>Conclusion</a:t>
+            </a:r>
+          </a:p>
+          <a:p>
+            <a:pPr marL="0" indent="0">
+              <a:spcBef>
+                <a:spcPts val="1200"/>
+              </a:spcBef>
+              <a:buClr>
+                <a:schemeClr val="tx1"/>
+              </a:buClr>
+              <a:buSzPct val="100000"/>
+              <a:buNone/>
+            </a:pPr>
+            <a:endParaRPr lang="en-GB" sz="2500" dirty="0">
+              <a:solidFill>
+                <a:schemeClr val="tx1"/>
+              </a:solidFill>
+              <a:latin typeface="PT Sans" panose="020B0503020203020204" pitchFamily="34" charset="77"/>
+              <a:cs typeface="Times New Roman" panose="02020603050405020304" pitchFamily="18" charset="0"/>
+            </a:endParaRPr>
+          </a:p>
+        </p:txBody>
+      </p:sp>
+    </p:spTree>
+  </p:cSld>
+  <p:clrMapOvr>
+    <a:masterClrMapping/>
+  </p:clrMapOvr>
+</p:sld>
+</file>
+
+<file path=ppt/slides/slide4.xml><?xml version="1.0" encoding="utf-8"?>
+<p:sld xmlns:a="http://schemas.openxmlformats.org/drawingml/2006/main" xmlns:r="http://schemas.openxmlformats.org/officeDocument/2006/relationships" xmlns:p="http://schemas.openxmlformats.org/presentationml/2006/main">
+  <p:cSld>
+    <p:spTree>
+      <p:nvGrpSpPr>
         <p:cNvPr id="1" name="Shape 62"/>
         <p:cNvGrpSpPr/>
         <p:nvPr/>
@@ -10318,654 +11015,6 @@
         <p14:creationId xmlns:p14="http://schemas.microsoft.com/office/powerpoint/2010/main" val="3119477040"/>
       </p:ext>
     </p:extLst>
-  </p:cSld>
-  <p:clrMapOvr>
-    <a:masterClrMapping/>
-  </p:clrMapOvr>
-</p:sld>
-</file>
-
-<file path=ppt/slides/slide4.xml><?xml version="1.0" encoding="utf-8"?>
-<p:sld xmlns:a="http://schemas.openxmlformats.org/drawingml/2006/main" xmlns:r="http://schemas.openxmlformats.org/officeDocument/2006/relationships" xmlns:p="http://schemas.openxmlformats.org/presentationml/2006/main">
-  <p:cSld>
-    <p:spTree>
-      <p:nvGrpSpPr>
-        <p:cNvPr id="1" name="Shape 75"/>
-        <p:cNvGrpSpPr/>
-        <p:nvPr/>
-      </p:nvGrpSpPr>
-      <p:grpSpPr>
-        <a:xfrm>
-          <a:off x="0" y="0"/>
-          <a:ext cx="0" cy="0"/>
-          <a:chOff x="0" y="0"/>
-          <a:chExt cx="0" cy="0"/>
-        </a:xfrm>
-      </p:grpSpPr>
-      <p:pic>
-        <p:nvPicPr>
-          <p:cNvPr id="77" name="Google Shape;77;p15"/>
-          <p:cNvPicPr preferRelativeResize="0"/>
-          <p:nvPr/>
-        </p:nvPicPr>
-        <p:blipFill>
-          <a:blip r:embed="rId3">
-            <a:alphaModFix/>
-          </a:blip>
-          <a:stretch>
-            <a:fillRect/>
-          </a:stretch>
-        </p:blipFill>
-        <p:spPr>
-          <a:xfrm>
-            <a:off x="6346480" y="184416"/>
-            <a:ext cx="2594462" cy="427704"/>
-          </a:xfrm>
-          <a:prstGeom prst="rect">
-            <a:avLst/>
-          </a:prstGeom>
-          <a:noFill/>
-          <a:ln>
-            <a:noFill/>
-          </a:ln>
-        </p:spPr>
-      </p:pic>
-      <p:sp>
-        <p:nvSpPr>
-          <p:cNvPr id="78" name="Google Shape;78;p15"/>
-          <p:cNvSpPr txBox="1">
-            <a:spLocks noGrp="1"/>
-          </p:cNvSpPr>
-          <p:nvPr>
-            <p:ph type="body" idx="4294967295"/>
-          </p:nvPr>
-        </p:nvSpPr>
-        <p:spPr>
-          <a:xfrm>
-            <a:off x="416459" y="1475716"/>
-            <a:ext cx="4680642" cy="2812326"/>
-          </a:xfrm>
-          <a:prstGeom prst="rect">
-            <a:avLst/>
-          </a:prstGeom>
-          <a:noFill/>
-          <a:ln>
-            <a:noFill/>
-          </a:ln>
-        </p:spPr>
-        <p:txBody>
-          <a:bodyPr spcFirstLastPara="1" wrap="square" lIns="0" tIns="91425" rIns="0" bIns="91425" anchor="t" anchorCtr="0">
-            <a:noAutofit/>
-          </a:bodyPr>
-          <a:lstStyle/>
-          <a:p>
-            <a:pPr marL="342900" marR="0" lvl="0" algn="l" rtl="0">
-              <a:lnSpc>
-                <a:spcPct val="115000"/>
-              </a:lnSpc>
-              <a:spcBef>
-                <a:spcPts val="1200"/>
-              </a:spcBef>
-              <a:spcAft>
-                <a:spcPts val="0"/>
-              </a:spcAft>
-              <a:buClr>
-                <a:schemeClr val="tx1"/>
-              </a:buClr>
-              <a:buSzPct val="100000"/>
-              <a:buFont typeface="Arial"/>
-              <a:buAutoNum type="arabicPeriod"/>
-            </a:pPr>
-            <a:r>
-              <a:rPr lang="en-GB" sz="2500" u="none" strike="noStrike" cap="none" dirty="0">
-                <a:solidFill>
-                  <a:schemeClr val="tx1"/>
-                </a:solidFill>
-                <a:latin typeface="PT Sans" panose="020B0503020203020204" pitchFamily="34" charset="77"/>
-                <a:cs typeface="Times New Roman" panose="02020603050405020304" pitchFamily="18" charset="0"/>
-                <a:sym typeface="Arial"/>
-              </a:rPr>
-              <a:t>Problem Statement</a:t>
-            </a:r>
-          </a:p>
-          <a:p>
-            <a:pPr marL="342900" marR="0" lvl="0" algn="l" rtl="0">
-              <a:lnSpc>
-                <a:spcPct val="115000"/>
-              </a:lnSpc>
-              <a:spcBef>
-                <a:spcPts val="1200"/>
-              </a:spcBef>
-              <a:spcAft>
-                <a:spcPts val="0"/>
-              </a:spcAft>
-              <a:buClr>
-                <a:schemeClr val="tx1"/>
-              </a:buClr>
-              <a:buSzPct val="100000"/>
-              <a:buFont typeface="Arial"/>
-              <a:buAutoNum type="arabicPeriod"/>
-            </a:pPr>
-            <a:r>
-              <a:rPr lang="en-GB" sz="2500" dirty="0">
-                <a:solidFill>
-                  <a:schemeClr val="tx1"/>
-                </a:solidFill>
-                <a:latin typeface="PT Sans" panose="020B0503020203020204" pitchFamily="34" charset="77"/>
-                <a:cs typeface="Times New Roman" panose="02020603050405020304" pitchFamily="18" charset="0"/>
-              </a:rPr>
-              <a:t>Process Flow</a:t>
-            </a:r>
-          </a:p>
-          <a:p>
-            <a:pPr marL="342900" marR="0" lvl="0" algn="l" rtl="0">
-              <a:lnSpc>
-                <a:spcPct val="115000"/>
-              </a:lnSpc>
-              <a:spcBef>
-                <a:spcPts val="1200"/>
-              </a:spcBef>
-              <a:spcAft>
-                <a:spcPts val="0"/>
-              </a:spcAft>
-              <a:buClr>
-                <a:schemeClr val="tx1"/>
-              </a:buClr>
-              <a:buSzPct val="100000"/>
-              <a:buFont typeface="Arial"/>
-              <a:buAutoNum type="arabicPeriod"/>
-            </a:pPr>
-            <a:r>
-              <a:rPr lang="en-GB" sz="2500" u="none" strike="noStrike" cap="none" dirty="0">
-                <a:solidFill>
-                  <a:schemeClr val="tx1"/>
-                </a:solidFill>
-                <a:latin typeface="PT Sans" panose="020B0503020203020204" pitchFamily="34" charset="77"/>
-                <a:cs typeface="Times New Roman" panose="02020603050405020304" pitchFamily="18" charset="0"/>
-                <a:sym typeface="Arial"/>
-              </a:rPr>
-              <a:t>Exploratory Data Analysis</a:t>
-            </a:r>
-          </a:p>
-          <a:p>
-            <a:pPr marL="342900" marR="0" lvl="0" algn="l" rtl="0">
-              <a:lnSpc>
-                <a:spcPct val="115000"/>
-              </a:lnSpc>
-              <a:spcBef>
-                <a:spcPts val="1200"/>
-              </a:spcBef>
-              <a:spcAft>
-                <a:spcPts val="0"/>
-              </a:spcAft>
-              <a:buClr>
-                <a:schemeClr val="tx1"/>
-              </a:buClr>
-              <a:buSzPct val="100000"/>
-              <a:buFont typeface="Arial"/>
-              <a:buAutoNum type="arabicPeriod"/>
-            </a:pPr>
-            <a:r>
-              <a:rPr lang="en-GB" sz="2500" dirty="0">
-                <a:solidFill>
-                  <a:schemeClr val="tx1"/>
-                </a:solidFill>
-                <a:latin typeface="PT Sans" panose="020B0503020203020204" pitchFamily="34" charset="77"/>
-                <a:cs typeface="Times New Roman" panose="02020603050405020304" pitchFamily="18" charset="0"/>
-              </a:rPr>
-              <a:t>Feature selection and engineering</a:t>
-            </a:r>
-            <a:endParaRPr sz="2500" u="none" strike="noStrike" cap="none" dirty="0">
-              <a:solidFill>
-                <a:schemeClr val="tx1"/>
-              </a:solidFill>
-              <a:latin typeface="PT Sans" panose="020B0503020203020204" pitchFamily="34" charset="77"/>
-              <a:cs typeface="Times New Roman" panose="02020603050405020304" pitchFamily="18" charset="0"/>
-              <a:sym typeface="Arial"/>
-            </a:endParaRPr>
-          </a:p>
-          <a:p>
-            <a:pPr marL="0" marR="0" lvl="0" indent="0" algn="l" rtl="0">
-              <a:lnSpc>
-                <a:spcPct val="115000"/>
-              </a:lnSpc>
-              <a:spcBef>
-                <a:spcPts val="1199"/>
-              </a:spcBef>
-              <a:spcAft>
-                <a:spcPts val="0"/>
-              </a:spcAft>
-              <a:buClr>
-                <a:schemeClr val="tx1"/>
-              </a:buClr>
-              <a:buSzPct val="100000"/>
-              <a:buFont typeface="Arial"/>
-              <a:buNone/>
-            </a:pPr>
-            <a:endParaRPr sz="2500" u="none" strike="noStrike" cap="none" dirty="0">
-              <a:solidFill>
-                <a:schemeClr val="tx1"/>
-              </a:solidFill>
-              <a:latin typeface="PT Sans" panose="020B0503020203020204" pitchFamily="34" charset="77"/>
-              <a:cs typeface="Times New Roman" panose="02020603050405020304" pitchFamily="18" charset="0"/>
-              <a:sym typeface="Arial"/>
-            </a:endParaRPr>
-          </a:p>
-        </p:txBody>
-      </p:sp>
-      <p:sp>
-        <p:nvSpPr>
-          <p:cNvPr id="7" name="Google Shape;67;p14">
-            <a:extLst>
-              <a:ext uri="{FF2B5EF4-FFF2-40B4-BE49-F238E27FC236}">
-                <a16:creationId xmlns:a16="http://schemas.microsoft.com/office/drawing/2014/main" id="{85D3EB7A-9511-F049-9180-188515890CC0}"/>
-              </a:ext>
-            </a:extLst>
-          </p:cNvPr>
-          <p:cNvSpPr txBox="1">
-            <a:spLocks noGrp="1"/>
-          </p:cNvSpPr>
-          <p:nvPr>
-            <p:ph type="subTitle" idx="1"/>
-          </p:nvPr>
-        </p:nvSpPr>
-        <p:spPr>
-          <a:xfrm>
-            <a:off x="416459" y="997440"/>
-            <a:ext cx="5353678" cy="447600"/>
-          </a:xfrm>
-          <a:prstGeom prst="rect">
-            <a:avLst/>
-          </a:prstGeom>
-        </p:spPr>
-        <p:txBody>
-          <a:bodyPr spcFirstLastPara="1" wrap="square" lIns="91425" tIns="91425" rIns="91425" bIns="91425" anchor="t" anchorCtr="0">
-            <a:noAutofit/>
-          </a:bodyPr>
-          <a:lstStyle/>
-          <a:p>
-            <a:pPr marL="0" lvl="0" indent="0" algn="l" rtl="0">
-              <a:lnSpc>
-                <a:spcPct val="80000"/>
-              </a:lnSpc>
-              <a:spcBef>
-                <a:spcPts val="0"/>
-              </a:spcBef>
-              <a:spcAft>
-                <a:spcPts val="0"/>
-              </a:spcAft>
-              <a:buNone/>
-            </a:pPr>
-            <a:r>
-              <a:rPr lang="en" sz="3200" b="1" dirty="0">
-                <a:solidFill>
-                  <a:schemeClr val="tx1"/>
-                </a:solidFill>
-                <a:latin typeface="PT Sans" panose="020B0503020203020204" pitchFamily="34" charset="77"/>
-                <a:cs typeface="Times New Roman" panose="02020603050405020304" pitchFamily="18" charset="0"/>
-              </a:rPr>
-              <a:t>Presentation Outline</a:t>
-            </a:r>
-            <a:endParaRPr sz="3200" b="1" dirty="0">
-              <a:solidFill>
-                <a:schemeClr val="tx1"/>
-              </a:solidFill>
-              <a:latin typeface="PT Sans" panose="020B0503020203020204" pitchFamily="34" charset="77"/>
-              <a:cs typeface="Times New Roman" panose="02020603050405020304" pitchFamily="18" charset="0"/>
-            </a:endParaRPr>
-          </a:p>
-        </p:txBody>
-      </p:sp>
-      <p:sp>
-        <p:nvSpPr>
-          <p:cNvPr id="8" name="Google Shape;78;p15">
-            <a:extLst>
-              <a:ext uri="{FF2B5EF4-FFF2-40B4-BE49-F238E27FC236}">
-                <a16:creationId xmlns:a16="http://schemas.microsoft.com/office/drawing/2014/main" id="{93577895-6796-794E-ADC2-2948F0A69EB2}"/>
-              </a:ext>
-            </a:extLst>
-          </p:cNvPr>
-          <p:cNvSpPr txBox="1">
-            <a:spLocks/>
-          </p:cNvSpPr>
-          <p:nvPr/>
-        </p:nvSpPr>
-        <p:spPr>
-          <a:xfrm>
-            <a:off x="5097101" y="1475716"/>
-            <a:ext cx="3938259" cy="3401888"/>
-          </a:xfrm>
-          <a:prstGeom prst="rect">
-            <a:avLst/>
-          </a:prstGeom>
-          <a:noFill/>
-          <a:ln>
-            <a:noFill/>
-          </a:ln>
-        </p:spPr>
-        <p:txBody>
-          <a:bodyPr spcFirstLastPara="1" wrap="square" lIns="0" tIns="91425" rIns="0" bIns="91425" anchor="t" anchorCtr="0">
-            <a:noAutofit/>
-          </a:bodyPr>
-          <a:lstStyle>
-            <a:defPPr marR="0" lvl="0" algn="l" rtl="0">
-              <a:lnSpc>
-                <a:spcPct val="100000"/>
-              </a:lnSpc>
-              <a:spcBef>
-                <a:spcPts val="0"/>
-              </a:spcBef>
-              <a:spcAft>
-                <a:spcPts val="0"/>
-              </a:spcAft>
-            </a:defPPr>
-            <a:lvl1pPr marL="457200" marR="0" lvl="0" indent="-342900" algn="l" rtl="0">
-              <a:lnSpc>
-                <a:spcPct val="115000"/>
-              </a:lnSpc>
-              <a:spcBef>
-                <a:spcPts val="0"/>
-              </a:spcBef>
-              <a:spcAft>
-                <a:spcPts val="0"/>
-              </a:spcAft>
-              <a:buClr>
-                <a:schemeClr val="dk2"/>
-              </a:buClr>
-              <a:buSzPts val="1800"/>
-              <a:buFont typeface="Arial"/>
-              <a:buChar char="●"/>
-              <a:defRPr sz="1800" b="0" i="0" u="none" strike="noStrike" cap="none">
-                <a:solidFill>
-                  <a:schemeClr val="dk2"/>
-                </a:solidFill>
-                <a:latin typeface="Arial"/>
-                <a:ea typeface="Arial"/>
-                <a:cs typeface="Arial"/>
-                <a:sym typeface="Arial"/>
-              </a:defRPr>
-            </a:lvl1pPr>
-            <a:lvl2pPr marL="914400" marR="0" lvl="1" indent="-317500" algn="l" rtl="0">
-              <a:lnSpc>
-                <a:spcPct val="115000"/>
-              </a:lnSpc>
-              <a:spcBef>
-                <a:spcPts val="0"/>
-              </a:spcBef>
-              <a:spcAft>
-                <a:spcPts val="0"/>
-              </a:spcAft>
-              <a:buClr>
-                <a:schemeClr val="dk2"/>
-              </a:buClr>
-              <a:buSzPts val="1400"/>
-              <a:buFont typeface="Arial"/>
-              <a:buChar char="○"/>
-              <a:defRPr sz="1400" b="0" i="0" u="none" strike="noStrike" cap="none">
-                <a:solidFill>
-                  <a:schemeClr val="dk2"/>
-                </a:solidFill>
-                <a:latin typeface="Arial"/>
-                <a:ea typeface="Arial"/>
-                <a:cs typeface="Arial"/>
-                <a:sym typeface="Arial"/>
-              </a:defRPr>
-            </a:lvl2pPr>
-            <a:lvl3pPr marL="1371600" marR="0" lvl="2" indent="-317500" algn="l" rtl="0">
-              <a:lnSpc>
-                <a:spcPct val="115000"/>
-              </a:lnSpc>
-              <a:spcBef>
-                <a:spcPts val="0"/>
-              </a:spcBef>
-              <a:spcAft>
-                <a:spcPts val="0"/>
-              </a:spcAft>
-              <a:buClr>
-                <a:schemeClr val="dk2"/>
-              </a:buClr>
-              <a:buSzPts val="1400"/>
-              <a:buFont typeface="Arial"/>
-              <a:buChar char="■"/>
-              <a:defRPr sz="1400" b="0" i="0" u="none" strike="noStrike" cap="none">
-                <a:solidFill>
-                  <a:schemeClr val="dk2"/>
-                </a:solidFill>
-                <a:latin typeface="Arial"/>
-                <a:ea typeface="Arial"/>
-                <a:cs typeface="Arial"/>
-                <a:sym typeface="Arial"/>
-              </a:defRPr>
-            </a:lvl3pPr>
-            <a:lvl4pPr marL="1828800" marR="0" lvl="3" indent="-317500" algn="l" rtl="0">
-              <a:lnSpc>
-                <a:spcPct val="115000"/>
-              </a:lnSpc>
-              <a:spcBef>
-                <a:spcPts val="0"/>
-              </a:spcBef>
-              <a:spcAft>
-                <a:spcPts val="0"/>
-              </a:spcAft>
-              <a:buClr>
-                <a:schemeClr val="dk2"/>
-              </a:buClr>
-              <a:buSzPts val="1400"/>
-              <a:buFont typeface="Arial"/>
-              <a:buChar char="●"/>
-              <a:defRPr sz="1400" b="0" i="0" u="none" strike="noStrike" cap="none">
-                <a:solidFill>
-                  <a:schemeClr val="dk2"/>
-                </a:solidFill>
-                <a:latin typeface="Arial"/>
-                <a:ea typeface="Arial"/>
-                <a:cs typeface="Arial"/>
-                <a:sym typeface="Arial"/>
-              </a:defRPr>
-            </a:lvl4pPr>
-            <a:lvl5pPr marL="2286000" marR="0" lvl="4" indent="-317500" algn="l" rtl="0">
-              <a:lnSpc>
-                <a:spcPct val="115000"/>
-              </a:lnSpc>
-              <a:spcBef>
-                <a:spcPts val="0"/>
-              </a:spcBef>
-              <a:spcAft>
-                <a:spcPts val="0"/>
-              </a:spcAft>
-              <a:buClr>
-                <a:schemeClr val="dk2"/>
-              </a:buClr>
-              <a:buSzPts val="1400"/>
-              <a:buFont typeface="Arial"/>
-              <a:buChar char="○"/>
-              <a:defRPr sz="1400" b="0" i="0" u="none" strike="noStrike" cap="none">
-                <a:solidFill>
-                  <a:schemeClr val="dk2"/>
-                </a:solidFill>
-                <a:latin typeface="Arial"/>
-                <a:ea typeface="Arial"/>
-                <a:cs typeface="Arial"/>
-                <a:sym typeface="Arial"/>
-              </a:defRPr>
-            </a:lvl5pPr>
-            <a:lvl6pPr marL="2743200" marR="0" lvl="5" indent="-317500" algn="l" rtl="0">
-              <a:lnSpc>
-                <a:spcPct val="115000"/>
-              </a:lnSpc>
-              <a:spcBef>
-                <a:spcPts val="0"/>
-              </a:spcBef>
-              <a:spcAft>
-                <a:spcPts val="0"/>
-              </a:spcAft>
-              <a:buClr>
-                <a:schemeClr val="dk2"/>
-              </a:buClr>
-              <a:buSzPts val="1400"/>
-              <a:buFont typeface="Arial"/>
-              <a:buChar char="■"/>
-              <a:defRPr sz="1400" b="0" i="0" u="none" strike="noStrike" cap="none">
-                <a:solidFill>
-                  <a:schemeClr val="dk2"/>
-                </a:solidFill>
-                <a:latin typeface="Arial"/>
-                <a:ea typeface="Arial"/>
-                <a:cs typeface="Arial"/>
-                <a:sym typeface="Arial"/>
-              </a:defRPr>
-            </a:lvl6pPr>
-            <a:lvl7pPr marL="3200400" marR="0" lvl="6" indent="-317500" algn="l" rtl="0">
-              <a:lnSpc>
-                <a:spcPct val="115000"/>
-              </a:lnSpc>
-              <a:spcBef>
-                <a:spcPts val="0"/>
-              </a:spcBef>
-              <a:spcAft>
-                <a:spcPts val="0"/>
-              </a:spcAft>
-              <a:buClr>
-                <a:schemeClr val="dk2"/>
-              </a:buClr>
-              <a:buSzPts val="1400"/>
-              <a:buFont typeface="Arial"/>
-              <a:buChar char="●"/>
-              <a:defRPr sz="1400" b="0" i="0" u="none" strike="noStrike" cap="none">
-                <a:solidFill>
-                  <a:schemeClr val="dk2"/>
-                </a:solidFill>
-                <a:latin typeface="Arial"/>
-                <a:ea typeface="Arial"/>
-                <a:cs typeface="Arial"/>
-                <a:sym typeface="Arial"/>
-              </a:defRPr>
-            </a:lvl7pPr>
-            <a:lvl8pPr marL="3657600" marR="0" lvl="7" indent="-317500" algn="l" rtl="0">
-              <a:lnSpc>
-                <a:spcPct val="115000"/>
-              </a:lnSpc>
-              <a:spcBef>
-                <a:spcPts val="0"/>
-              </a:spcBef>
-              <a:spcAft>
-                <a:spcPts val="0"/>
-              </a:spcAft>
-              <a:buClr>
-                <a:schemeClr val="dk2"/>
-              </a:buClr>
-              <a:buSzPts val="1400"/>
-              <a:buFont typeface="Arial"/>
-              <a:buChar char="○"/>
-              <a:defRPr sz="1400" b="0" i="0" u="none" strike="noStrike" cap="none">
-                <a:solidFill>
-                  <a:schemeClr val="dk2"/>
-                </a:solidFill>
-                <a:latin typeface="Arial"/>
-                <a:ea typeface="Arial"/>
-                <a:cs typeface="Arial"/>
-                <a:sym typeface="Arial"/>
-              </a:defRPr>
-            </a:lvl8pPr>
-            <a:lvl9pPr marL="4114800" marR="0" lvl="8" indent="-317500" algn="l" rtl="0">
-              <a:lnSpc>
-                <a:spcPct val="115000"/>
-              </a:lnSpc>
-              <a:spcBef>
-                <a:spcPts val="0"/>
-              </a:spcBef>
-              <a:spcAft>
-                <a:spcPts val="0"/>
-              </a:spcAft>
-              <a:buClr>
-                <a:schemeClr val="dk2"/>
-              </a:buClr>
-              <a:buSzPts val="1400"/>
-              <a:buFont typeface="Arial"/>
-              <a:buChar char="■"/>
-              <a:defRPr sz="1400" b="0" i="0" u="none" strike="noStrike" cap="none">
-                <a:solidFill>
-                  <a:schemeClr val="dk2"/>
-                </a:solidFill>
-                <a:latin typeface="Arial"/>
-                <a:ea typeface="Arial"/>
-                <a:cs typeface="Arial"/>
-                <a:sym typeface="Arial"/>
-              </a:defRPr>
-            </a:lvl9pPr>
-          </a:lstStyle>
-          <a:p>
-            <a:pPr indent="-457200">
-              <a:spcBef>
-                <a:spcPts val="1200"/>
-              </a:spcBef>
-              <a:buClr>
-                <a:schemeClr val="tx1"/>
-              </a:buClr>
-              <a:buSzPct val="100000"/>
-              <a:buFont typeface="+mj-lt"/>
-              <a:buAutoNum type="arabicPeriod" startAt="5"/>
-            </a:pPr>
-            <a:r>
-              <a:rPr lang="en-GB" sz="2500" dirty="0">
-                <a:solidFill>
-                  <a:schemeClr val="tx1"/>
-                </a:solidFill>
-                <a:latin typeface="PT Sans" panose="020B0503020203020204" pitchFamily="34" charset="77"/>
-                <a:cs typeface="Times New Roman" panose="02020603050405020304" pitchFamily="18" charset="0"/>
-              </a:rPr>
-              <a:t>Model Training and Evaluation</a:t>
-            </a:r>
-          </a:p>
-          <a:p>
-            <a:pPr indent="-457200">
-              <a:spcBef>
-                <a:spcPts val="1200"/>
-              </a:spcBef>
-              <a:buClr>
-                <a:schemeClr val="tx1"/>
-              </a:buClr>
-              <a:buSzPct val="100000"/>
-              <a:buFont typeface="+mj-lt"/>
-              <a:buAutoNum type="arabicPeriod" startAt="5"/>
-            </a:pPr>
-            <a:r>
-              <a:rPr lang="en-GB" sz="2500" dirty="0">
-                <a:solidFill>
-                  <a:schemeClr val="tx1"/>
-                </a:solidFill>
-                <a:latin typeface="PT Sans" panose="020B0503020203020204" pitchFamily="34" charset="77"/>
-                <a:cs typeface="Times New Roman" panose="02020603050405020304" pitchFamily="18" charset="0"/>
-              </a:rPr>
-              <a:t>Summary of Solution</a:t>
-            </a:r>
-          </a:p>
-          <a:p>
-            <a:pPr indent="-457200">
-              <a:spcBef>
-                <a:spcPts val="1200"/>
-              </a:spcBef>
-              <a:buClr>
-                <a:schemeClr val="tx1"/>
-              </a:buClr>
-              <a:buSzPct val="100000"/>
-              <a:buFont typeface="+mj-lt"/>
-              <a:buAutoNum type="arabicPeriod" startAt="5"/>
-            </a:pPr>
-            <a:r>
-              <a:rPr lang="en-GB" sz="2500" dirty="0">
-                <a:solidFill>
-                  <a:schemeClr val="tx1"/>
-                </a:solidFill>
-                <a:latin typeface="PT Sans" panose="020B0503020203020204" pitchFamily="34" charset="77"/>
-                <a:cs typeface="Times New Roman" panose="02020603050405020304" pitchFamily="18" charset="0"/>
-              </a:rPr>
-              <a:t>Conclusion</a:t>
-            </a:r>
-          </a:p>
-        </p:txBody>
-      </p:sp>
-    </p:spTree>
   </p:cSld>
   <p:clrMapOvr>
     <a:masterClrMapping/>

</xml_diff>